<commit_message>
changed and added some plots, changed powerpoint presentation
</commit_message>
<xml_diff>
--- a/article-and-presentation/Lagornii_IA-213_UFO_Presentation.pptx
+++ b/article-and-presentation/Lagornii_IA-213_UFO_Presentation.pptx
@@ -22,16 +22,18 @@
     <p:sldId id="266" r:id="rId17"/>
     <p:sldId id="267" r:id="rId18"/>
     <p:sldId id="268" r:id="rId19"/>
+    <p:sldId id="269" r:id="rId20"/>
+    <p:sldId id="270" r:id="rId21"/>
   </p:sldIdLst>
   <p:sldSz cy="6858000" cx="9144000"/>
   <p:notesSz cx="6858000" cy="9144000"/>
   <p:embeddedFontLst>
     <p:embeddedFont>
       <p:font typeface="PT Sans"/>
-      <p:regular r:id="rId20"/>
-      <p:bold r:id="rId21"/>
-      <p:italic r:id="rId22"/>
-      <p:boldItalic r:id="rId23"/>
+      <p:regular r:id="rId22"/>
+      <p:bold r:id="rId23"/>
+      <p:italic r:id="rId24"/>
+      <p:boldItalic r:id="rId25"/>
     </p:embeddedFont>
   </p:embeddedFontLst>
   <p:defaultTextStyle>
@@ -279,7 +281,7 @@
       </p15:sldGuideLst>
     </p:ext>
     <p:ext uri="GoogleSlidesCustomDataVersion2">
-      <go:slidesCustomData xmlns:go="http://customooxmlschemas.google.com/" r:id="rId24" roundtripDataSignature="AMtx7mhtIkwZqtFuaPEfShUuLShVUVNWgg=="/>
+      <go:slidesCustomData xmlns:go="http://customooxmlschemas.google.com/" r:id="rId26" roundtripDataSignature="AMtx7mid2hEntWktMEMPHJ3ETqxYoMcvbA=="/>
     </p:ext>
   </p:extLst>
 </p:presentation>
@@ -1835,7 +1837,7 @@
   <p:cSld>
     <p:spTree>
       <p:nvGrpSpPr>
-        <p:cNvPr id="145" name="Shape 145"/>
+        <p:cNvPr id="146" name="Shape 146"/>
         <p:cNvGrpSpPr/>
         <p:nvPr/>
       </p:nvGrpSpPr>
@@ -1849,7 +1851,7 @@
       </p:grpSpPr>
       <p:sp>
         <p:nvSpPr>
-          <p:cNvPr id="146" name="Google Shape;146;g29b2f7f38cc_0_0:notes"/>
+          <p:cNvPr id="147" name="Google Shape;147;g29b2f7f38cc_0_0:notes"/>
           <p:cNvSpPr/>
           <p:nvPr>
             <p:ph idx="2" type="sldImg"/>
@@ -1894,7 +1896,7 @@
       </p:sp>
       <p:sp>
         <p:nvSpPr>
-          <p:cNvPr id="147" name="Google Shape;147;g29b2f7f38cc_0_0:notes"/>
+          <p:cNvPr id="148" name="Google Shape;148;g29b2f7f38cc_0_0:notes"/>
           <p:cNvSpPr txBox="1"/>
           <p:nvPr>
             <p:ph idx="1" type="body"/>
@@ -1941,7 +1943,7 @@
       </p:sp>
       <p:sp>
         <p:nvSpPr>
-          <p:cNvPr id="148" name="Google Shape;148;g29b2f7f38cc_0_0:notes"/>
+          <p:cNvPr id="149" name="Google Shape;149;g29b2f7f38cc_0_0:notes"/>
           <p:cNvSpPr txBox="1"/>
           <p:nvPr>
             <p:ph idx="12" type="sldNum"/>
@@ -2000,7 +2002,7 @@
   <p:cSld>
     <p:spTree>
       <p:nvGrpSpPr>
-        <p:cNvPr id="153" name="Shape 153"/>
+        <p:cNvPr id="154" name="Shape 154"/>
         <p:cNvGrpSpPr/>
         <p:nvPr/>
       </p:nvGrpSpPr>
@@ -2014,7 +2016,7 @@
       </p:grpSpPr>
       <p:sp>
         <p:nvSpPr>
-          <p:cNvPr id="154" name="Google Shape;154;g29b061f263b_1_0:notes"/>
+          <p:cNvPr id="155" name="Google Shape;155;g29b061f263b_1_0:notes"/>
           <p:cNvSpPr/>
           <p:nvPr>
             <p:ph idx="2" type="sldImg"/>
@@ -2059,7 +2061,7 @@
       </p:sp>
       <p:sp>
         <p:nvSpPr>
-          <p:cNvPr id="155" name="Google Shape;155;g29b061f263b_1_0:notes"/>
+          <p:cNvPr id="156" name="Google Shape;156;g29b061f263b_1_0:notes"/>
           <p:cNvSpPr txBox="1"/>
           <p:nvPr>
             <p:ph idx="1" type="body"/>
@@ -2106,7 +2108,7 @@
       </p:sp>
       <p:sp>
         <p:nvSpPr>
-          <p:cNvPr id="156" name="Google Shape;156;g29b061f263b_1_0:notes"/>
+          <p:cNvPr id="157" name="Google Shape;157;g29b061f263b_1_0:notes"/>
           <p:cNvSpPr txBox="1"/>
           <p:nvPr>
             <p:ph idx="12" type="sldNum"/>
@@ -2165,7 +2167,7 @@
   <p:cSld>
     <p:spTree>
       <p:nvGrpSpPr>
-        <p:cNvPr id="160" name="Shape 160"/>
+        <p:cNvPr id="162" name="Shape 162"/>
         <p:cNvGrpSpPr/>
         <p:nvPr/>
       </p:nvGrpSpPr>
@@ -2179,7 +2181,7 @@
       </p:grpSpPr>
       <p:sp>
         <p:nvSpPr>
-          <p:cNvPr id="161" name="Google Shape;161;g1ec41259802_0_23:notes"/>
+          <p:cNvPr id="163" name="Google Shape;163;g2a7dbd87e0e_0_18:notes"/>
           <p:cNvSpPr/>
           <p:nvPr>
             <p:ph idx="2" type="sldImg"/>
@@ -2224,7 +2226,7 @@
       </p:sp>
       <p:sp>
         <p:nvSpPr>
-          <p:cNvPr id="162" name="Google Shape;162;g1ec41259802_0_23:notes"/>
+          <p:cNvPr id="164" name="Google Shape;164;g2a7dbd87e0e_0_18:notes"/>
           <p:cNvSpPr txBox="1"/>
           <p:nvPr>
             <p:ph idx="1" type="body"/>
@@ -2271,7 +2273,7 @@
       </p:sp>
       <p:sp>
         <p:nvSpPr>
-          <p:cNvPr id="163" name="Google Shape;163;g1ec41259802_0_23:notes"/>
+          <p:cNvPr id="165" name="Google Shape;165;g2a7dbd87e0e_0_18:notes"/>
           <p:cNvSpPr txBox="1"/>
           <p:nvPr>
             <p:ph idx="12" type="sldNum"/>
@@ -2330,7 +2332,7 @@
   <p:cSld>
     <p:spTree>
       <p:nvGrpSpPr>
-        <p:cNvPr id="167" name="Shape 167"/>
+        <p:cNvPr id="169" name="Shape 169"/>
         <p:cNvGrpSpPr/>
         <p:nvPr/>
       </p:nvGrpSpPr>
@@ -2344,7 +2346,337 @@
       </p:grpSpPr>
       <p:sp>
         <p:nvSpPr>
-          <p:cNvPr id="168" name="Google Shape;168;p4:notes"/>
+          <p:cNvPr id="170" name="Google Shape;170;g2a7dbd87e0e_0_2:notes"/>
+          <p:cNvSpPr/>
+          <p:nvPr>
+            <p:ph idx="2" type="sldImg"/>
+          </p:nvPr>
+        </p:nvSpPr>
+        <p:spPr>
+          <a:xfrm>
+            <a:off x="1371600" y="1143000"/>
+            <a:ext cx="4114800" cy="3086100"/>
+          </a:xfrm>
+          <a:custGeom>
+            <a:rect b="b" l="l" r="r" t="t"/>
+            <a:pathLst>
+              <a:path extrusionOk="0" h="120000" w="120000">
+                <a:moveTo>
+                  <a:pt x="0" y="0"/>
+                </a:moveTo>
+                <a:lnTo>
+                  <a:pt x="120000" y="0"/>
+                </a:lnTo>
+                <a:lnTo>
+                  <a:pt x="120000" y="120000"/>
+                </a:lnTo>
+                <a:lnTo>
+                  <a:pt x="0" y="120000"/>
+                </a:lnTo>
+                <a:close/>
+              </a:path>
+            </a:pathLst>
+          </a:custGeom>
+          <a:noFill/>
+          <a:ln cap="flat" cmpd="sng" w="12700">
+            <a:solidFill>
+              <a:srgbClr val="000000"/>
+            </a:solidFill>
+            <a:prstDash val="solid"/>
+            <a:round/>
+            <a:headEnd len="sm" w="sm" type="none"/>
+            <a:tailEnd len="sm" w="sm" type="none"/>
+          </a:ln>
+        </p:spPr>
+      </p:sp>
+      <p:sp>
+        <p:nvSpPr>
+          <p:cNvPr id="171" name="Google Shape;171;g2a7dbd87e0e_0_2:notes"/>
+          <p:cNvSpPr txBox="1"/>
+          <p:nvPr>
+            <p:ph idx="1" type="body"/>
+          </p:nvPr>
+        </p:nvSpPr>
+        <p:spPr>
+          <a:xfrm>
+            <a:off x="685800" y="4400550"/>
+            <a:ext cx="5486400" cy="3600600"/>
+          </a:xfrm>
+          <a:prstGeom prst="rect">
+            <a:avLst/>
+          </a:prstGeom>
+          <a:noFill/>
+          <a:ln>
+            <a:noFill/>
+          </a:ln>
+        </p:spPr>
+        <p:txBody>
+          <a:bodyPr anchorCtr="0" anchor="t" bIns="45700" lIns="91425" spcFirstLastPara="1" rIns="91425" wrap="square" tIns="45700">
+            <a:noAutofit/>
+          </a:bodyPr>
+          <a:lstStyle/>
+          <a:p>
+            <a:pPr indent="0" lvl="0" marL="0" rtl="0" algn="l">
+              <a:lnSpc>
+                <a:spcPct val="100000"/>
+              </a:lnSpc>
+              <a:spcBef>
+                <a:spcPts val="0"/>
+              </a:spcBef>
+              <a:spcAft>
+                <a:spcPts val="0"/>
+              </a:spcAft>
+              <a:buSzPts val="1400"/>
+              <a:buNone/>
+            </a:pPr>
+            <a:r>
+              <a:t/>
+            </a:r>
+            <a:endParaRPr/>
+          </a:p>
+        </p:txBody>
+      </p:sp>
+      <p:sp>
+        <p:nvSpPr>
+          <p:cNvPr id="172" name="Google Shape;172;g2a7dbd87e0e_0_2:notes"/>
+          <p:cNvSpPr txBox="1"/>
+          <p:nvPr>
+            <p:ph idx="12" type="sldNum"/>
+          </p:nvPr>
+        </p:nvSpPr>
+        <p:spPr>
+          <a:xfrm>
+            <a:off x="3884613" y="8685213"/>
+            <a:ext cx="2971800" cy="458700"/>
+          </a:xfrm>
+          <a:prstGeom prst="rect">
+            <a:avLst/>
+          </a:prstGeom>
+          <a:noFill/>
+          <a:ln>
+            <a:noFill/>
+          </a:ln>
+        </p:spPr>
+        <p:txBody>
+          <a:bodyPr anchorCtr="0" anchor="b" bIns="45700" lIns="91425" spcFirstLastPara="1" rIns="91425" wrap="square" tIns="45700">
+            <a:noAutofit/>
+          </a:bodyPr>
+          <a:lstStyle/>
+          <a:p>
+            <a:pPr indent="0" lvl="0" marL="0" rtl="0" algn="r">
+              <a:lnSpc>
+                <a:spcPct val="100000"/>
+              </a:lnSpc>
+              <a:spcBef>
+                <a:spcPts val="0"/>
+              </a:spcBef>
+              <a:spcAft>
+                <a:spcPts val="0"/>
+              </a:spcAft>
+              <a:buSzPts val="1400"/>
+              <a:buNone/>
+            </a:pPr>
+            <a:fld id="{00000000-1234-1234-1234-123412341234}" type="slidenum">
+              <a:rPr lang="fr-FR"/>
+              <a:t>‹#›</a:t>
+            </a:fld>
+            <a:endParaRPr/>
+          </a:p>
+        </p:txBody>
+      </p:sp>
+    </p:spTree>
+  </p:cSld>
+  <p:clrMapOvr>
+    <a:masterClrMapping/>
+  </p:clrMapOvr>
+</p:notes>
+</file>
+
+<file path=ppt/notesSlides/notesSlide14.xml><?xml version="1.0" encoding="utf-8"?>
+<p:notes xmlns:a="http://schemas.openxmlformats.org/drawingml/2006/main" xmlns:r="http://schemas.openxmlformats.org/officeDocument/2006/relationships" xmlns:mc="http://schemas.openxmlformats.org/markup-compatibility/2006" xmlns:mv="urn:schemas-microsoft-com:mac:vml" xmlns:p="http://schemas.openxmlformats.org/presentationml/2006/main" xmlns:c="http://schemas.openxmlformats.org/drawingml/2006/chart" xmlns:dgm="http://schemas.openxmlformats.org/drawingml/2006/diagram" xmlns:o="urn:schemas-microsoft-com:office:office" xmlns:v="urn:schemas-microsoft-com:vml" xmlns:pvml="urn:schemas-microsoft-com:office:powerpoint" xmlns:com="http://schemas.openxmlformats.org/drawingml/2006/compatibility" xmlns:p14="http://schemas.microsoft.com/office/powerpoint/2010/main" xmlns:p15="http://schemas.microsoft.com/office/powerpoint/2012/main" xmlns:ahyp="http://schemas.microsoft.com/office/drawing/2018/hyperlinkcolor" showMasterPhAnim="0" showMasterSp="0">
+  <p:cSld>
+    <p:spTree>
+      <p:nvGrpSpPr>
+        <p:cNvPr id="177" name="Shape 177"/>
+        <p:cNvGrpSpPr/>
+        <p:nvPr/>
+      </p:nvGrpSpPr>
+      <p:grpSpPr>
+        <a:xfrm>
+          <a:off x="0" y="0"/>
+          <a:ext cx="0" cy="0"/>
+          <a:chOff x="0" y="0"/>
+          <a:chExt cx="0" cy="0"/>
+        </a:xfrm>
+      </p:grpSpPr>
+      <p:sp>
+        <p:nvSpPr>
+          <p:cNvPr id="178" name="Google Shape;178;g1ec41259802_0_23:notes"/>
+          <p:cNvSpPr/>
+          <p:nvPr>
+            <p:ph idx="2" type="sldImg"/>
+          </p:nvPr>
+        </p:nvSpPr>
+        <p:spPr>
+          <a:xfrm>
+            <a:off x="1371600" y="1143000"/>
+            <a:ext cx="4114800" cy="3086100"/>
+          </a:xfrm>
+          <a:custGeom>
+            <a:rect b="b" l="l" r="r" t="t"/>
+            <a:pathLst>
+              <a:path extrusionOk="0" h="120000" w="120000">
+                <a:moveTo>
+                  <a:pt x="0" y="0"/>
+                </a:moveTo>
+                <a:lnTo>
+                  <a:pt x="120000" y="0"/>
+                </a:lnTo>
+                <a:lnTo>
+                  <a:pt x="120000" y="120000"/>
+                </a:lnTo>
+                <a:lnTo>
+                  <a:pt x="0" y="120000"/>
+                </a:lnTo>
+                <a:close/>
+              </a:path>
+            </a:pathLst>
+          </a:custGeom>
+          <a:noFill/>
+          <a:ln cap="flat" cmpd="sng" w="12700">
+            <a:solidFill>
+              <a:srgbClr val="000000"/>
+            </a:solidFill>
+            <a:prstDash val="solid"/>
+            <a:round/>
+            <a:headEnd len="sm" w="sm" type="none"/>
+            <a:tailEnd len="sm" w="sm" type="none"/>
+          </a:ln>
+        </p:spPr>
+      </p:sp>
+      <p:sp>
+        <p:nvSpPr>
+          <p:cNvPr id="179" name="Google Shape;179;g1ec41259802_0_23:notes"/>
+          <p:cNvSpPr txBox="1"/>
+          <p:nvPr>
+            <p:ph idx="1" type="body"/>
+          </p:nvPr>
+        </p:nvSpPr>
+        <p:spPr>
+          <a:xfrm>
+            <a:off x="685800" y="4400550"/>
+            <a:ext cx="5486400" cy="3600600"/>
+          </a:xfrm>
+          <a:prstGeom prst="rect">
+            <a:avLst/>
+          </a:prstGeom>
+          <a:noFill/>
+          <a:ln>
+            <a:noFill/>
+          </a:ln>
+        </p:spPr>
+        <p:txBody>
+          <a:bodyPr anchorCtr="0" anchor="t" bIns="45700" lIns="91425" spcFirstLastPara="1" rIns="91425" wrap="square" tIns="45700">
+            <a:noAutofit/>
+          </a:bodyPr>
+          <a:lstStyle/>
+          <a:p>
+            <a:pPr indent="0" lvl="0" marL="0" rtl="0" algn="l">
+              <a:lnSpc>
+                <a:spcPct val="100000"/>
+              </a:lnSpc>
+              <a:spcBef>
+                <a:spcPts val="0"/>
+              </a:spcBef>
+              <a:spcAft>
+                <a:spcPts val="0"/>
+              </a:spcAft>
+              <a:buSzPts val="1400"/>
+              <a:buNone/>
+            </a:pPr>
+            <a:r>
+              <a:t/>
+            </a:r>
+            <a:endParaRPr/>
+          </a:p>
+        </p:txBody>
+      </p:sp>
+      <p:sp>
+        <p:nvSpPr>
+          <p:cNvPr id="180" name="Google Shape;180;g1ec41259802_0_23:notes"/>
+          <p:cNvSpPr txBox="1"/>
+          <p:nvPr>
+            <p:ph idx="12" type="sldNum"/>
+          </p:nvPr>
+        </p:nvSpPr>
+        <p:spPr>
+          <a:xfrm>
+            <a:off x="3884613" y="8685213"/>
+            <a:ext cx="2971800" cy="458700"/>
+          </a:xfrm>
+          <a:prstGeom prst="rect">
+            <a:avLst/>
+          </a:prstGeom>
+          <a:noFill/>
+          <a:ln>
+            <a:noFill/>
+          </a:ln>
+        </p:spPr>
+        <p:txBody>
+          <a:bodyPr anchorCtr="0" anchor="b" bIns="45700" lIns="91425" spcFirstLastPara="1" rIns="91425" wrap="square" tIns="45700">
+            <a:noAutofit/>
+          </a:bodyPr>
+          <a:lstStyle/>
+          <a:p>
+            <a:pPr indent="0" lvl="0" marL="0" rtl="0" algn="r">
+              <a:lnSpc>
+                <a:spcPct val="100000"/>
+              </a:lnSpc>
+              <a:spcBef>
+                <a:spcPts val="0"/>
+              </a:spcBef>
+              <a:spcAft>
+                <a:spcPts val="0"/>
+              </a:spcAft>
+              <a:buSzPts val="1400"/>
+              <a:buNone/>
+            </a:pPr>
+            <a:fld id="{00000000-1234-1234-1234-123412341234}" type="slidenum">
+              <a:rPr lang="fr-FR"/>
+              <a:t>‹#›</a:t>
+            </a:fld>
+            <a:endParaRPr/>
+          </a:p>
+        </p:txBody>
+      </p:sp>
+    </p:spTree>
+  </p:cSld>
+  <p:clrMapOvr>
+    <a:masterClrMapping/>
+  </p:clrMapOvr>
+</p:notes>
+</file>
+
+<file path=ppt/notesSlides/notesSlide15.xml><?xml version="1.0" encoding="utf-8"?>
+<p:notes xmlns:a="http://schemas.openxmlformats.org/drawingml/2006/main" xmlns:r="http://schemas.openxmlformats.org/officeDocument/2006/relationships" xmlns:mc="http://schemas.openxmlformats.org/markup-compatibility/2006" xmlns:mv="urn:schemas-microsoft-com:mac:vml" xmlns:p="http://schemas.openxmlformats.org/presentationml/2006/main" xmlns:c="http://schemas.openxmlformats.org/drawingml/2006/chart" xmlns:dgm="http://schemas.openxmlformats.org/drawingml/2006/diagram" xmlns:o="urn:schemas-microsoft-com:office:office" xmlns:v="urn:schemas-microsoft-com:vml" xmlns:pvml="urn:schemas-microsoft-com:office:powerpoint" xmlns:com="http://schemas.openxmlformats.org/drawingml/2006/compatibility" xmlns:p14="http://schemas.microsoft.com/office/powerpoint/2010/main" xmlns:p15="http://schemas.microsoft.com/office/powerpoint/2012/main" xmlns:ahyp="http://schemas.microsoft.com/office/drawing/2018/hyperlinkcolor" showMasterPhAnim="0" showMasterSp="0">
+  <p:cSld>
+    <p:spTree>
+      <p:nvGrpSpPr>
+        <p:cNvPr id="184" name="Shape 184"/>
+        <p:cNvGrpSpPr/>
+        <p:nvPr/>
+      </p:nvGrpSpPr>
+      <p:grpSpPr>
+        <a:xfrm>
+          <a:off x="0" y="0"/>
+          <a:ext cx="0" cy="0"/>
+          <a:chOff x="0" y="0"/>
+          <a:chExt cx="0" cy="0"/>
+        </a:xfrm>
+      </p:grpSpPr>
+      <p:sp>
+        <p:nvSpPr>
+          <p:cNvPr id="185" name="Google Shape;185;p4:notes"/>
           <p:cNvSpPr txBox="1"/>
           <p:nvPr>
             <p:ph idx="1" type="body"/>
@@ -2391,7 +2723,7 @@
       </p:sp>
       <p:sp>
         <p:nvSpPr>
-          <p:cNvPr id="169" name="Google Shape;169;p4:notes"/>
+          <p:cNvPr id="186" name="Google Shape;186;p4:notes"/>
           <p:cNvSpPr/>
           <p:nvPr>
             <p:ph idx="2" type="sldImg"/>
@@ -2564,7 +2896,7 @@
   <p:cSld>
     <p:spTree>
       <p:nvGrpSpPr>
-        <p:cNvPr id="95" name="Shape 95"/>
+        <p:cNvPr id="96" name="Shape 96"/>
         <p:cNvGrpSpPr/>
         <p:nvPr/>
       </p:nvGrpSpPr>
@@ -2578,7 +2910,7 @@
       </p:grpSpPr>
       <p:sp>
         <p:nvSpPr>
-          <p:cNvPr id="96" name="Google Shape;96;p3:notes"/>
+          <p:cNvPr id="97" name="Google Shape;97;p3:notes"/>
           <p:cNvSpPr/>
           <p:nvPr>
             <p:ph idx="2" type="sldImg"/>
@@ -2623,7 +2955,7 @@
       </p:sp>
       <p:sp>
         <p:nvSpPr>
-          <p:cNvPr id="97" name="Google Shape;97;p3:notes"/>
+          <p:cNvPr id="98" name="Google Shape;98;p3:notes"/>
           <p:cNvSpPr txBox="1"/>
           <p:nvPr>
             <p:ph idx="1" type="body"/>
@@ -2670,7 +3002,7 @@
       </p:sp>
       <p:sp>
         <p:nvSpPr>
-          <p:cNvPr id="98" name="Google Shape;98;p3:notes"/>
+          <p:cNvPr id="99" name="Google Shape;99;p3:notes"/>
           <p:cNvSpPr txBox="1"/>
           <p:nvPr>
             <p:ph idx="12" type="sldNum"/>
@@ -2729,7 +3061,7 @@
   <p:cSld>
     <p:spTree>
       <p:nvGrpSpPr>
-        <p:cNvPr id="103" name="Shape 103"/>
+        <p:cNvPr id="104" name="Shape 104"/>
         <p:cNvGrpSpPr/>
         <p:nvPr/>
       </p:nvGrpSpPr>
@@ -2743,7 +3075,7 @@
       </p:grpSpPr>
       <p:sp>
         <p:nvSpPr>
-          <p:cNvPr id="104" name="Google Shape;104;g1eb480128fd_0_1:notes"/>
+          <p:cNvPr id="105" name="Google Shape;105;g1eb480128fd_0_1:notes"/>
           <p:cNvSpPr/>
           <p:nvPr>
             <p:ph idx="2" type="sldImg"/>
@@ -2788,7 +3120,7 @@
       </p:sp>
       <p:sp>
         <p:nvSpPr>
-          <p:cNvPr id="105" name="Google Shape;105;g1eb480128fd_0_1:notes"/>
+          <p:cNvPr id="106" name="Google Shape;106;g1eb480128fd_0_1:notes"/>
           <p:cNvSpPr txBox="1"/>
           <p:nvPr>
             <p:ph idx="1" type="body"/>
@@ -2835,7 +3167,7 @@
       </p:sp>
       <p:sp>
         <p:nvSpPr>
-          <p:cNvPr id="106" name="Google Shape;106;g1eb480128fd_0_1:notes"/>
+          <p:cNvPr id="107" name="Google Shape;107;g1eb480128fd_0_1:notes"/>
           <p:cNvSpPr txBox="1"/>
           <p:nvPr>
             <p:ph idx="12" type="sldNum"/>
@@ -2894,7 +3226,7 @@
   <p:cSld>
     <p:spTree>
       <p:nvGrpSpPr>
-        <p:cNvPr id="110" name="Shape 110"/>
+        <p:cNvPr id="111" name="Shape 111"/>
         <p:cNvGrpSpPr/>
         <p:nvPr/>
       </p:nvGrpSpPr>
@@ -2908,7 +3240,7 @@
       </p:grpSpPr>
       <p:sp>
         <p:nvSpPr>
-          <p:cNvPr id="111" name="Google Shape;111;g1ec41259802_0_8:notes"/>
+          <p:cNvPr id="112" name="Google Shape;112;g1ec41259802_0_8:notes"/>
           <p:cNvSpPr/>
           <p:nvPr>
             <p:ph idx="2" type="sldImg"/>
@@ -2953,7 +3285,7 @@
       </p:sp>
       <p:sp>
         <p:nvSpPr>
-          <p:cNvPr id="112" name="Google Shape;112;g1ec41259802_0_8:notes"/>
+          <p:cNvPr id="113" name="Google Shape;113;g1ec41259802_0_8:notes"/>
           <p:cNvSpPr txBox="1"/>
           <p:nvPr>
             <p:ph idx="1" type="body"/>
@@ -3000,7 +3332,7 @@
       </p:sp>
       <p:sp>
         <p:nvSpPr>
-          <p:cNvPr id="113" name="Google Shape;113;g1ec41259802_0_8:notes"/>
+          <p:cNvPr id="114" name="Google Shape;114;g1ec41259802_0_8:notes"/>
           <p:cNvSpPr txBox="1"/>
           <p:nvPr>
             <p:ph idx="12" type="sldNum"/>
@@ -3059,7 +3391,7 @@
   <p:cSld>
     <p:spTree>
       <p:nvGrpSpPr>
-        <p:cNvPr id="117" name="Shape 117"/>
+        <p:cNvPr id="118" name="Shape 118"/>
         <p:cNvGrpSpPr/>
         <p:nvPr/>
       </p:nvGrpSpPr>
@@ -3073,7 +3405,7 @@
       </p:grpSpPr>
       <p:sp>
         <p:nvSpPr>
-          <p:cNvPr id="118" name="Google Shape;118;g1ec41259802_0_15:notes"/>
+          <p:cNvPr id="119" name="Google Shape;119;g1ec41259802_0_15:notes"/>
           <p:cNvSpPr/>
           <p:nvPr>
             <p:ph idx="2" type="sldImg"/>
@@ -3118,7 +3450,7 @@
       </p:sp>
       <p:sp>
         <p:nvSpPr>
-          <p:cNvPr id="119" name="Google Shape;119;g1ec41259802_0_15:notes"/>
+          <p:cNvPr id="120" name="Google Shape;120;g1ec41259802_0_15:notes"/>
           <p:cNvSpPr txBox="1"/>
           <p:nvPr>
             <p:ph idx="1" type="body"/>
@@ -3165,7 +3497,7 @@
       </p:sp>
       <p:sp>
         <p:nvSpPr>
-          <p:cNvPr id="120" name="Google Shape;120;g1ec41259802_0_15:notes"/>
+          <p:cNvPr id="121" name="Google Shape;121;g1ec41259802_0_15:notes"/>
           <p:cNvSpPr txBox="1"/>
           <p:nvPr>
             <p:ph idx="12" type="sldNum"/>
@@ -3224,7 +3556,7 @@
   <p:cSld>
     <p:spTree>
       <p:nvGrpSpPr>
-        <p:cNvPr id="124" name="Shape 124"/>
+        <p:cNvPr id="125" name="Shape 125"/>
         <p:cNvGrpSpPr/>
         <p:nvPr/>
       </p:nvGrpSpPr>
@@ -3238,7 +3570,7 @@
       </p:grpSpPr>
       <p:sp>
         <p:nvSpPr>
-          <p:cNvPr id="125" name="Google Shape;125;g29b2f7f38cc_0_10:notes"/>
+          <p:cNvPr id="126" name="Google Shape;126;g29b2f7f38cc_0_10:notes"/>
           <p:cNvSpPr/>
           <p:nvPr>
             <p:ph idx="2" type="sldImg"/>
@@ -3283,7 +3615,7 @@
       </p:sp>
       <p:sp>
         <p:nvSpPr>
-          <p:cNvPr id="126" name="Google Shape;126;g29b2f7f38cc_0_10:notes"/>
+          <p:cNvPr id="127" name="Google Shape;127;g29b2f7f38cc_0_10:notes"/>
           <p:cNvSpPr txBox="1"/>
           <p:nvPr>
             <p:ph idx="1" type="body"/>
@@ -3330,7 +3662,7 @@
       </p:sp>
       <p:sp>
         <p:nvSpPr>
-          <p:cNvPr id="127" name="Google Shape;127;g29b2f7f38cc_0_10:notes"/>
+          <p:cNvPr id="128" name="Google Shape;128;g29b2f7f38cc_0_10:notes"/>
           <p:cNvSpPr txBox="1"/>
           <p:nvPr>
             <p:ph idx="12" type="sldNum"/>
@@ -3389,7 +3721,7 @@
   <p:cSld>
     <p:spTree>
       <p:nvGrpSpPr>
-        <p:cNvPr id="131" name="Shape 131"/>
+        <p:cNvPr id="132" name="Shape 132"/>
         <p:cNvGrpSpPr/>
         <p:nvPr/>
       </p:nvGrpSpPr>
@@ -3403,7 +3735,7 @@
       </p:grpSpPr>
       <p:sp>
         <p:nvSpPr>
-          <p:cNvPr id="132" name="Google Shape;132;g28b56c42b40_0_0:notes"/>
+          <p:cNvPr id="133" name="Google Shape;133;g28b56c42b40_0_0:notes"/>
           <p:cNvSpPr/>
           <p:nvPr>
             <p:ph idx="2" type="sldImg"/>
@@ -3448,7 +3780,7 @@
       </p:sp>
       <p:sp>
         <p:nvSpPr>
-          <p:cNvPr id="133" name="Google Shape;133;g28b56c42b40_0_0:notes"/>
+          <p:cNvPr id="134" name="Google Shape;134;g28b56c42b40_0_0:notes"/>
           <p:cNvSpPr txBox="1"/>
           <p:nvPr>
             <p:ph idx="1" type="body"/>
@@ -3495,7 +3827,7 @@
       </p:sp>
       <p:sp>
         <p:nvSpPr>
-          <p:cNvPr id="134" name="Google Shape;134;g28b56c42b40_0_0:notes"/>
+          <p:cNvPr id="135" name="Google Shape;135;g28b56c42b40_0_0:notes"/>
           <p:cNvSpPr txBox="1"/>
           <p:nvPr>
             <p:ph idx="12" type="sldNum"/>
@@ -3554,7 +3886,7 @@
   <p:cSld>
     <p:spTree>
       <p:nvGrpSpPr>
-        <p:cNvPr id="138" name="Shape 138"/>
+        <p:cNvPr id="139" name="Shape 139"/>
         <p:cNvGrpSpPr/>
         <p:nvPr/>
       </p:nvGrpSpPr>
@@ -3568,7 +3900,7 @@
       </p:grpSpPr>
       <p:sp>
         <p:nvSpPr>
-          <p:cNvPr id="139" name="Google Shape;139;g28b52198a15_0_1:notes"/>
+          <p:cNvPr id="140" name="Google Shape;140;g28b52198a15_0_1:notes"/>
           <p:cNvSpPr/>
           <p:nvPr>
             <p:ph idx="2" type="sldImg"/>
@@ -3613,7 +3945,7 @@
       </p:sp>
       <p:sp>
         <p:nvSpPr>
-          <p:cNvPr id="140" name="Google Shape;140;g28b52198a15_0_1:notes"/>
+          <p:cNvPr id="141" name="Google Shape;141;g28b52198a15_0_1:notes"/>
           <p:cNvSpPr txBox="1"/>
           <p:nvPr>
             <p:ph idx="1" type="body"/>
@@ -3660,7 +3992,7 @@
       </p:sp>
       <p:sp>
         <p:nvSpPr>
-          <p:cNvPr id="141" name="Google Shape;141;g28b52198a15_0_1:notes"/>
+          <p:cNvPr id="142" name="Google Shape;142;g28b52198a15_0_1:notes"/>
           <p:cNvSpPr txBox="1"/>
           <p:nvPr>
             <p:ph idx="12" type="sldNum"/>
@@ -18279,7 +18611,31 @@
                 <a:cs typeface="PT Sans"/>
                 <a:sym typeface="PT Sans"/>
               </a:rPr>
-              <a:t>Analysis of Reports of UFO sightings (alt. Looking at </a:t>
+              <a:t>Analysis of Reports </a:t>
+            </a:r>
+            <a:r>
+              <a:rPr b="1" i="0" lang="fr-FR" sz="2400" u="none" cap="none" strike="noStrike">
+                <a:solidFill>
+                  <a:schemeClr val="dk1"/>
+                </a:solidFill>
+                <a:latin typeface="PT Sans"/>
+                <a:ea typeface="PT Sans"/>
+                <a:cs typeface="PT Sans"/>
+                <a:sym typeface="PT Sans"/>
+              </a:rPr>
+              <a:t>of</a:t>
+            </a:r>
+            <a:r>
+              <a:rPr b="1" i="0" lang="fr-FR" sz="2400" u="none" cap="none" strike="noStrike">
+                <a:solidFill>
+                  <a:schemeClr val="dk1"/>
+                </a:solidFill>
+                <a:latin typeface="PT Sans"/>
+                <a:ea typeface="PT Sans"/>
+                <a:cs typeface="PT Sans"/>
+                <a:sym typeface="PT Sans"/>
+              </a:rPr>
+              <a:t> UFO sightings (alt. Looking at </a:t>
             </a:r>
             <a:r>
               <a:rPr b="1" lang="fr-FR" sz="2400">
@@ -18408,7 +18764,7 @@
     </p:bg>
     <p:spTree>
       <p:nvGrpSpPr>
-        <p:cNvPr id="149" name="Shape 149"/>
+        <p:cNvPr id="150" name="Shape 150"/>
         <p:cNvGrpSpPr/>
         <p:nvPr/>
       </p:nvGrpSpPr>
@@ -18422,7 +18778,7 @@
       </p:grpSpPr>
       <p:sp>
         <p:nvSpPr>
-          <p:cNvPr id="150" name="Google Shape;150;g29b2f7f38cc_0_0"/>
+          <p:cNvPr id="151" name="Google Shape;151;g29b2f7f38cc_0_0"/>
           <p:cNvSpPr txBox="1"/>
           <p:nvPr>
             <p:ph idx="12" type="sldNum"/>
@@ -18470,7 +18826,7 @@
       </p:sp>
       <p:sp>
         <p:nvSpPr>
-          <p:cNvPr id="151" name="Google Shape;151;g29b2f7f38cc_0_0"/>
+          <p:cNvPr id="152" name="Google Shape;152;g29b2f7f38cc_0_0"/>
           <p:cNvSpPr txBox="1"/>
           <p:nvPr/>
         </p:nvSpPr>
@@ -18511,7 +18867,7 @@
               <a:buNone/>
             </a:pPr>
             <a:r>
-              <a:rPr b="1" lang="fr-FR" sz="1600">
+              <a:rPr b="1" lang="fr-FR" sz="2800">
                 <a:solidFill>
                   <a:schemeClr val="dk1"/>
                 </a:solidFill>
@@ -18522,7 +18878,7 @@
               </a:rPr>
               <a:t>Word Cloud from the Comments</a:t>
             </a:r>
-            <a:endParaRPr b="1" sz="1600" cap="none" strike="noStrike">
+            <a:endParaRPr b="1" sz="2800" cap="none" strike="noStrike">
               <a:solidFill>
                 <a:schemeClr val="dk1"/>
               </a:solidFill>
@@ -18536,7 +18892,7 @@
       </p:sp>
       <p:pic>
         <p:nvPicPr>
-          <p:cNvPr id="152" name="Google Shape;152;g29b2f7f38cc_0_0"/>
+          <p:cNvPr id="153" name="Google Shape;153;g29b2f7f38cc_0_0"/>
           <p:cNvPicPr preferRelativeResize="0"/>
           <p:nvPr/>
         </p:nvPicPr>
@@ -18550,8 +18906,8 @@
         </p:blipFill>
         <p:spPr>
           <a:xfrm>
-            <a:off x="1654608" y="1981875"/>
-            <a:ext cx="5952844" cy="4374476"/>
+            <a:off x="1645550" y="2055325"/>
+            <a:ext cx="5852901" cy="4301025"/>
           </a:xfrm>
           <a:prstGeom prst="rect">
             <a:avLst/>
@@ -18587,7 +18943,7 @@
     </p:bg>
     <p:spTree>
       <p:nvGrpSpPr>
-        <p:cNvPr id="157" name="Shape 157"/>
+        <p:cNvPr id="158" name="Shape 158"/>
         <p:cNvGrpSpPr/>
         <p:nvPr/>
       </p:nvGrpSpPr>
@@ -18601,7 +18957,7 @@
       </p:grpSpPr>
       <p:sp>
         <p:nvSpPr>
-          <p:cNvPr id="158" name="Google Shape;158;g29b061f263b_1_0"/>
+          <p:cNvPr id="159" name="Google Shape;159;g29b061f263b_1_0"/>
           <p:cNvSpPr txBox="1"/>
           <p:nvPr>
             <p:ph idx="12" type="sldNum"/>
@@ -18647,24 +19003,16 @@
           </a:p>
         </p:txBody>
       </p:sp>
-      <p:pic>
-        <p:nvPicPr>
-          <p:cNvPr id="159" name="Google Shape;159;g29b061f263b_1_0"/>
-          <p:cNvPicPr preferRelativeResize="0"/>
+      <p:sp>
+        <p:nvSpPr>
+          <p:cNvPr id="160" name="Google Shape;160;g29b061f263b_1_0"/>
+          <p:cNvSpPr txBox="1"/>
           <p:nvPr/>
-        </p:nvPicPr>
-        <p:blipFill>
-          <a:blip r:embed="rId4">
-            <a:alphaModFix/>
-          </a:blip>
-          <a:stretch>
-            <a:fillRect/>
-          </a:stretch>
-        </p:blipFill>
+        </p:nvSpPr>
         <p:spPr>
           <a:xfrm>
-            <a:off x="737488" y="1521525"/>
-            <a:ext cx="7669026" cy="4834825"/>
+            <a:off x="0" y="1535275"/>
+            <a:ext cx="9144000" cy="615600"/>
           </a:xfrm>
           <a:prstGeom prst="rect">
             <a:avLst/>
@@ -18674,7 +19022,319 @@
             <a:noFill/>
           </a:ln>
         </p:spPr>
-      </p:pic>
+        <p:txBody>
+          <a:bodyPr anchorCtr="0" anchor="t" bIns="91425" lIns="91425" spcFirstLastPara="1" rIns="91425" wrap="square" tIns="91425">
+            <a:spAutoFit/>
+          </a:bodyPr>
+          <a:lstStyle/>
+          <a:p>
+            <a:pPr indent="0" lvl="0" marL="0" rtl="0" algn="ctr">
+              <a:spcBef>
+                <a:spcPts val="0"/>
+              </a:spcBef>
+              <a:spcAft>
+                <a:spcPts val="0"/>
+              </a:spcAft>
+              <a:buNone/>
+            </a:pPr>
+            <a:r>
+              <a:rPr b="1" lang="fr-FR" sz="2800">
+                <a:solidFill>
+                  <a:schemeClr val="dk1"/>
+                </a:solidFill>
+                <a:latin typeface="Calibri"/>
+                <a:ea typeface="Calibri"/>
+                <a:cs typeface="Calibri"/>
+                <a:sym typeface="Calibri"/>
+              </a:rPr>
+              <a:t>Model for Predicting the Number of Reports</a:t>
+            </a:r>
+            <a:endParaRPr b="1" sz="2800">
+              <a:solidFill>
+                <a:schemeClr val="dk1"/>
+              </a:solidFill>
+              <a:latin typeface="Calibri"/>
+              <a:ea typeface="Calibri"/>
+              <a:cs typeface="Calibri"/>
+              <a:sym typeface="Calibri"/>
+            </a:endParaRPr>
+          </a:p>
+        </p:txBody>
+      </p:sp>
+      <p:sp>
+        <p:nvSpPr>
+          <p:cNvPr id="161" name="Google Shape;161;g29b061f263b_1_0"/>
+          <p:cNvSpPr txBox="1"/>
+          <p:nvPr/>
+        </p:nvSpPr>
+        <p:spPr>
+          <a:xfrm>
+            <a:off x="0" y="2150875"/>
+            <a:ext cx="9144000" cy="1932000"/>
+          </a:xfrm>
+          <a:prstGeom prst="rect">
+            <a:avLst/>
+          </a:prstGeom>
+          <a:noFill/>
+          <a:ln>
+            <a:noFill/>
+          </a:ln>
+        </p:spPr>
+        <p:txBody>
+          <a:bodyPr anchorCtr="0" anchor="ctr" bIns="45700" lIns="91425" spcFirstLastPara="1" rIns="91425" wrap="square" tIns="45700">
+            <a:noAutofit/>
+          </a:bodyPr>
+          <a:lstStyle/>
+          <a:p>
+            <a:pPr indent="-342900" lvl="0" marL="342900" marR="0" rtl="0" algn="l">
+              <a:lnSpc>
+                <a:spcPct val="100000"/>
+              </a:lnSpc>
+              <a:spcBef>
+                <a:spcPts val="0"/>
+              </a:spcBef>
+              <a:spcAft>
+                <a:spcPts val="0"/>
+              </a:spcAft>
+              <a:buClr>
+                <a:schemeClr val="dk1"/>
+              </a:buClr>
+              <a:buSzPts val="2400"/>
+              <a:buFont typeface="Arial"/>
+              <a:buChar char="•"/>
+            </a:pPr>
+            <a:r>
+              <a:rPr b="1" i="0" lang="fr-FR" sz="2400" u="none" cap="none" strike="noStrike">
+                <a:solidFill>
+                  <a:schemeClr val="dk1"/>
+                </a:solidFill>
+                <a:latin typeface="PT Sans"/>
+                <a:ea typeface="PT Sans"/>
+                <a:cs typeface="PT Sans"/>
+                <a:sym typeface="PT Sans"/>
+              </a:rPr>
+              <a:t>Problem:</a:t>
+            </a:r>
+            <a:r>
+              <a:rPr b="0" i="0" lang="fr-FR" sz="2400" u="none" cap="none" strike="noStrike">
+                <a:solidFill>
+                  <a:schemeClr val="dk1"/>
+                </a:solidFill>
+                <a:latin typeface="PT Sans"/>
+                <a:ea typeface="PT Sans"/>
+                <a:cs typeface="PT Sans"/>
+                <a:sym typeface="PT Sans"/>
+              </a:rPr>
+              <a:t> </a:t>
+            </a:r>
+            <a:r>
+              <a:rPr lang="fr-FR" sz="2400">
+                <a:solidFill>
+                  <a:schemeClr val="dk1"/>
+                </a:solidFill>
+                <a:latin typeface="PT Sans"/>
+                <a:ea typeface="PT Sans"/>
+                <a:cs typeface="PT Sans"/>
+                <a:sym typeface="PT Sans"/>
+              </a:rPr>
+              <a:t>Given a year predict the number of UFO sightings that year</a:t>
+            </a:r>
+            <a:endParaRPr b="0" i="0" sz="2400" u="none" cap="none" strike="noStrike">
+              <a:solidFill>
+                <a:srgbClr val="000000"/>
+              </a:solidFill>
+              <a:latin typeface="Arial"/>
+              <a:ea typeface="Arial"/>
+              <a:cs typeface="Arial"/>
+              <a:sym typeface="Arial"/>
+            </a:endParaRPr>
+          </a:p>
+          <a:p>
+            <a:pPr indent="-342900" lvl="0" marL="342900" marR="0" rtl="0" algn="l">
+              <a:lnSpc>
+                <a:spcPct val="100000"/>
+              </a:lnSpc>
+              <a:spcBef>
+                <a:spcPts val="0"/>
+              </a:spcBef>
+              <a:spcAft>
+                <a:spcPts val="0"/>
+              </a:spcAft>
+              <a:buClr>
+                <a:schemeClr val="dk1"/>
+              </a:buClr>
+              <a:buSzPts val="2400"/>
+              <a:buFont typeface="Arial"/>
+              <a:buChar char="•"/>
+            </a:pPr>
+            <a:r>
+              <a:rPr b="1" i="0" lang="fr-FR" sz="2400" u="none" cap="none" strike="noStrike">
+                <a:solidFill>
+                  <a:schemeClr val="dk1"/>
+                </a:solidFill>
+                <a:latin typeface="PT Sans"/>
+                <a:ea typeface="PT Sans"/>
+                <a:cs typeface="PT Sans"/>
+                <a:sym typeface="PT Sans"/>
+              </a:rPr>
+              <a:t>Chosen </a:t>
+            </a:r>
+            <a:r>
+              <a:rPr b="1" lang="fr-FR" sz="2400">
+                <a:solidFill>
+                  <a:schemeClr val="dk1"/>
+                </a:solidFill>
+                <a:latin typeface="PT Sans"/>
+                <a:ea typeface="PT Sans"/>
+                <a:cs typeface="PT Sans"/>
+                <a:sym typeface="PT Sans"/>
+              </a:rPr>
+              <a:t>Statistical Model: </a:t>
+            </a:r>
+            <a:r>
+              <a:rPr lang="fr-FR" sz="2400" u="sng">
+                <a:solidFill>
+                  <a:schemeClr val="dk1"/>
+                </a:solidFill>
+                <a:latin typeface="PT Sans"/>
+                <a:ea typeface="PT Sans"/>
+                <a:cs typeface="PT Sans"/>
+                <a:sym typeface="PT Sans"/>
+              </a:rPr>
+              <a:t>Linear Regression</a:t>
+            </a:r>
+            <a:r>
+              <a:rPr lang="fr-FR" sz="2400">
+                <a:solidFill>
+                  <a:schemeClr val="dk1"/>
+                </a:solidFill>
+                <a:latin typeface="PT Sans"/>
+                <a:ea typeface="PT Sans"/>
+                <a:cs typeface="PT Sans"/>
+                <a:sym typeface="PT Sans"/>
+              </a:rPr>
+              <a:t> with one variable —  </a:t>
+            </a:r>
+            <a:r>
+              <a:rPr i="1" lang="fr-FR" sz="2400">
+                <a:solidFill>
+                  <a:schemeClr val="dk1"/>
+                </a:solidFill>
+                <a:latin typeface="PT Sans"/>
+                <a:ea typeface="PT Sans"/>
+                <a:cs typeface="PT Sans"/>
+                <a:sym typeface="PT Sans"/>
+              </a:rPr>
+              <a:t>y = wx + b</a:t>
+            </a:r>
+            <a:r>
+              <a:rPr lang="fr-FR" sz="2400">
+                <a:solidFill>
+                  <a:schemeClr val="dk1"/>
+                </a:solidFill>
+                <a:latin typeface="PT Sans"/>
+                <a:ea typeface="PT Sans"/>
+                <a:cs typeface="PT Sans"/>
+                <a:sym typeface="PT Sans"/>
+              </a:rPr>
+              <a:t>, where </a:t>
+            </a:r>
+            <a:r>
+              <a:rPr lang="fr-FR" sz="2400" u="sng">
+                <a:solidFill>
+                  <a:schemeClr val="dk1"/>
+                </a:solidFill>
+                <a:latin typeface="PT Sans"/>
+                <a:ea typeface="PT Sans"/>
+                <a:cs typeface="PT Sans"/>
+                <a:sym typeface="PT Sans"/>
+              </a:rPr>
+              <a:t>x</a:t>
+            </a:r>
+            <a:r>
+              <a:rPr lang="fr-FR" sz="2400">
+                <a:solidFill>
+                  <a:schemeClr val="dk1"/>
+                </a:solidFill>
+                <a:latin typeface="PT Sans"/>
+                <a:ea typeface="PT Sans"/>
+                <a:cs typeface="PT Sans"/>
+                <a:sym typeface="PT Sans"/>
+              </a:rPr>
+              <a:t> is the </a:t>
+            </a:r>
+            <a:r>
+              <a:rPr lang="fr-FR" sz="2400" u="sng">
+                <a:solidFill>
+                  <a:schemeClr val="dk1"/>
+                </a:solidFill>
+                <a:latin typeface="PT Sans"/>
+                <a:ea typeface="PT Sans"/>
+                <a:cs typeface="PT Sans"/>
+                <a:sym typeface="PT Sans"/>
+              </a:rPr>
+              <a:t>year</a:t>
+            </a:r>
+            <a:r>
+              <a:rPr lang="fr-FR" sz="2400">
+                <a:solidFill>
+                  <a:schemeClr val="dk1"/>
+                </a:solidFill>
+                <a:latin typeface="PT Sans"/>
+                <a:ea typeface="PT Sans"/>
+                <a:cs typeface="PT Sans"/>
+                <a:sym typeface="PT Sans"/>
+              </a:rPr>
+              <a:t> and </a:t>
+            </a:r>
+            <a:r>
+              <a:rPr lang="fr-FR" sz="2400" u="sng">
+                <a:solidFill>
+                  <a:schemeClr val="dk1"/>
+                </a:solidFill>
+                <a:latin typeface="PT Sans"/>
+                <a:ea typeface="PT Sans"/>
+                <a:cs typeface="PT Sans"/>
+                <a:sym typeface="PT Sans"/>
+              </a:rPr>
+              <a:t>y</a:t>
+            </a:r>
+            <a:r>
+              <a:rPr lang="fr-FR" sz="2400">
+                <a:solidFill>
+                  <a:schemeClr val="dk1"/>
+                </a:solidFill>
+                <a:latin typeface="PT Sans"/>
+                <a:ea typeface="PT Sans"/>
+                <a:cs typeface="PT Sans"/>
+                <a:sym typeface="PT Sans"/>
+              </a:rPr>
+              <a:t> is the </a:t>
+            </a:r>
+            <a:r>
+              <a:rPr lang="fr-FR" sz="2400" u="sng">
+                <a:solidFill>
+                  <a:schemeClr val="dk1"/>
+                </a:solidFill>
+                <a:latin typeface="PT Sans"/>
+                <a:ea typeface="PT Sans"/>
+                <a:cs typeface="PT Sans"/>
+                <a:sym typeface="PT Sans"/>
+              </a:rPr>
+              <a:t>number of UFO reports</a:t>
+            </a:r>
+            <a:endParaRPr sz="2400">
+              <a:solidFill>
+                <a:schemeClr val="dk1"/>
+              </a:solidFill>
+              <a:latin typeface="PT Sans"/>
+              <a:ea typeface="PT Sans"/>
+              <a:cs typeface="PT Sans"/>
+              <a:sym typeface="PT Sans"/>
+            </a:endParaRPr>
+          </a:p>
+        </p:txBody>
+      </p:sp>
     </p:spTree>
   </p:cSld>
   <p:clrMapOvr>
@@ -18700,7 +19360,7 @@
     </p:bg>
     <p:spTree>
       <p:nvGrpSpPr>
-        <p:cNvPr id="164" name="Shape 164"/>
+        <p:cNvPr id="166" name="Shape 166"/>
         <p:cNvGrpSpPr/>
         <p:nvPr/>
       </p:nvGrpSpPr>
@@ -18714,7 +19374,7 @@
       </p:grpSpPr>
       <p:sp>
         <p:nvSpPr>
-          <p:cNvPr id="165" name="Google Shape;165;g1ec41259802_0_23"/>
+          <p:cNvPr id="167" name="Google Shape;167;g2a7dbd87e0e_0_18"/>
           <p:cNvSpPr txBox="1"/>
           <p:nvPr>
             <p:ph idx="12" type="sldNum"/>
@@ -18762,7 +19422,7 @@
       </p:sp>
       <p:pic>
         <p:nvPicPr>
-          <p:cNvPr id="166" name="Google Shape;166;g1ec41259802_0_23"/>
+          <p:cNvPr id="168" name="Google Shape;168;g2a7dbd87e0e_0_18"/>
           <p:cNvPicPr preferRelativeResize="0"/>
           <p:nvPr/>
         </p:nvPicPr>
@@ -18776,8 +19436,8 @@
         </p:blipFill>
         <p:spPr>
           <a:xfrm>
-            <a:off x="741662" y="1526800"/>
-            <a:ext cx="7660674" cy="4829550"/>
+            <a:off x="758225" y="1547675"/>
+            <a:ext cx="7627550" cy="4808676"/>
           </a:xfrm>
           <a:prstGeom prst="rect">
             <a:avLst/>
@@ -18813,7 +19473,7 @@
     </p:bg>
     <p:spTree>
       <p:nvGrpSpPr>
-        <p:cNvPr id="170" name="Shape 170"/>
+        <p:cNvPr id="173" name="Shape 173"/>
         <p:cNvGrpSpPr/>
         <p:nvPr/>
       </p:nvGrpSpPr>
@@ -18827,16 +19487,16 @@
       </p:grpSpPr>
       <p:sp>
         <p:nvSpPr>
-          <p:cNvPr id="171" name="Google Shape;171;p4"/>
+          <p:cNvPr id="174" name="Google Shape;174;g2a7dbd87e0e_0_2"/>
           <p:cNvSpPr txBox="1"/>
           <p:nvPr>
-            <p:ph idx="1" type="body"/>
+            <p:ph idx="12" type="sldNum"/>
           </p:nvPr>
         </p:nvSpPr>
         <p:spPr>
           <a:xfrm>
-            <a:off x="749300" y="1873250"/>
-            <a:ext cx="7766050" cy="3111499"/>
+            <a:off x="6457950" y="6356350"/>
+            <a:ext cx="2057400" cy="365100"/>
           </a:xfrm>
           <a:prstGeom prst="rect">
             <a:avLst/>
@@ -18847,90 +19507,271 @@
           </a:ln>
         </p:spPr>
         <p:txBody>
-          <a:bodyPr anchorCtr="0" anchor="t" bIns="45700" lIns="91425" spcFirstLastPara="1" rIns="91425" wrap="square" tIns="45700">
-            <a:normAutofit/>
+          <a:bodyPr anchorCtr="0" anchor="ctr" bIns="45700" lIns="91425" spcFirstLastPara="1" rIns="91425" wrap="square" tIns="45700">
+            <a:noAutofit/>
           </a:bodyPr>
           <a:lstStyle/>
           <a:p>
-            <a:pPr indent="0" lvl="0" marL="0" rtl="0" algn="l">
-              <a:lnSpc>
-                <a:spcPct val="90000"/>
-              </a:lnSpc>
-              <a:spcBef>
-                <a:spcPts val="0"/>
-              </a:spcBef>
-              <a:spcAft>
-                <a:spcPts val="0"/>
-              </a:spcAft>
-              <a:buClr>
-                <a:schemeClr val="dk1"/>
-              </a:buClr>
-              <a:buSzPts val="2400"/>
+            <a:pPr indent="0" lvl="0" marL="0" rtl="0" algn="r">
+              <a:lnSpc>
+                <a:spcPct val="100000"/>
+              </a:lnSpc>
+              <a:spcBef>
+                <a:spcPts val="0"/>
+              </a:spcBef>
+              <a:spcAft>
+                <a:spcPts val="0"/>
+              </a:spcAft>
+              <a:buSzPts val="1200"/>
               <a:buNone/>
             </a:pPr>
-            <a:r>
-              <a:rPr b="1" lang="fr-FR" sz="2400">
-                <a:latin typeface="PT Sans"/>
-                <a:ea typeface="PT Sans"/>
-                <a:cs typeface="PT Sans"/>
-                <a:sym typeface="PT Sans"/>
-              </a:rPr>
-              <a:t>BIBLIOGRAPHY:</a:t>
-            </a:r>
-            <a:endParaRPr b="1" sz="2400">
-              <a:latin typeface="PT Sans"/>
-              <a:ea typeface="PT Sans"/>
-              <a:cs typeface="PT Sans"/>
-              <a:sym typeface="PT Sans"/>
-            </a:endParaRPr>
-          </a:p>
-          <a:p>
-            <a:pPr indent="-514350" lvl="0" marL="514350" rtl="0" algn="l">
-              <a:lnSpc>
-                <a:spcPct val="90000"/>
-              </a:lnSpc>
-              <a:spcBef>
-                <a:spcPts val="1000"/>
-              </a:spcBef>
-              <a:spcAft>
-                <a:spcPts val="0"/>
-              </a:spcAft>
-              <a:buClr>
-                <a:schemeClr val="dk1"/>
-              </a:buClr>
-              <a:buSzPts val="2400"/>
-              <a:buFont typeface="Arial"/>
-              <a:buChar char="•"/>
-            </a:pPr>
-            <a:r>
-              <a:rPr lang="fr-FR" sz="2400" u="sng">
-                <a:solidFill>
-                  <a:schemeClr val="hlink"/>
-                </a:solidFill>
-                <a:latin typeface="PT Sans"/>
-                <a:ea typeface="PT Sans"/>
-                <a:cs typeface="PT Sans"/>
-                <a:sym typeface="PT Sans"/>
-                <a:hlinkClick r:id="rId4"/>
-              </a:rPr>
-              <a:t>https://www.kaggle.com/datasets/NUFORC/ufo-sightings</a:t>
-            </a:r>
-            <a:r>
-              <a:rPr lang="fr-FR" sz="2400">
-                <a:latin typeface="PT Sans"/>
-                <a:ea typeface="PT Sans"/>
-                <a:cs typeface="PT Sans"/>
-                <a:sym typeface="PT Sans"/>
-              </a:rPr>
-              <a:t> - Used Dataset</a:t>
-            </a:r>
-            <a:endParaRPr sz="2400"/>
+            <a:fld id="{00000000-1234-1234-1234-123412341234}" type="slidenum">
+              <a:rPr lang="fr-FR"/>
+              <a:t>‹#›</a:t>
+            </a:fld>
+            <a:endParaRPr/>
           </a:p>
         </p:txBody>
       </p:sp>
       <p:sp>
         <p:nvSpPr>
-          <p:cNvPr id="172" name="Google Shape;172;p4"/>
+          <p:cNvPr id="175" name="Google Shape;175;g2a7dbd87e0e_0_2"/>
+          <p:cNvSpPr txBox="1"/>
+          <p:nvPr/>
+        </p:nvSpPr>
+        <p:spPr>
+          <a:xfrm>
+            <a:off x="0" y="1535275"/>
+            <a:ext cx="9144000" cy="615600"/>
+          </a:xfrm>
+          <a:prstGeom prst="rect">
+            <a:avLst/>
+          </a:prstGeom>
+          <a:noFill/>
+          <a:ln>
+            <a:noFill/>
+          </a:ln>
+        </p:spPr>
+        <p:txBody>
+          <a:bodyPr anchorCtr="0" anchor="t" bIns="91425" lIns="91425" spcFirstLastPara="1" rIns="91425" wrap="square" tIns="91425">
+            <a:spAutoFit/>
+          </a:bodyPr>
+          <a:lstStyle/>
+          <a:p>
+            <a:pPr indent="0" lvl="0" marL="0" rtl="0" algn="ctr">
+              <a:spcBef>
+                <a:spcPts val="0"/>
+              </a:spcBef>
+              <a:spcAft>
+                <a:spcPts val="0"/>
+              </a:spcAft>
+              <a:buNone/>
+            </a:pPr>
+            <a:r>
+              <a:rPr b="1" lang="fr-FR" sz="2800">
+                <a:solidFill>
+                  <a:schemeClr val="dk1"/>
+                </a:solidFill>
+                <a:latin typeface="Calibri"/>
+                <a:ea typeface="Calibri"/>
+                <a:cs typeface="Calibri"/>
+                <a:sym typeface="Calibri"/>
+              </a:rPr>
+              <a:t>Model Summary</a:t>
+            </a:r>
+            <a:endParaRPr b="1" sz="2800">
+              <a:solidFill>
+                <a:schemeClr val="dk1"/>
+              </a:solidFill>
+              <a:latin typeface="Calibri"/>
+              <a:ea typeface="Calibri"/>
+              <a:cs typeface="Calibri"/>
+              <a:sym typeface="Calibri"/>
+            </a:endParaRPr>
+          </a:p>
+        </p:txBody>
+      </p:sp>
+      <p:pic>
+        <p:nvPicPr>
+          <p:cNvPr id="176" name="Google Shape;176;g2a7dbd87e0e_0_2"/>
+          <p:cNvPicPr preferRelativeResize="0"/>
+          <p:nvPr/>
+        </p:nvPicPr>
+        <p:blipFill>
+          <a:blip r:embed="rId4">
+            <a:alphaModFix/>
+          </a:blip>
+          <a:stretch>
+            <a:fillRect/>
+          </a:stretch>
+        </p:blipFill>
+        <p:spPr>
+          <a:xfrm>
+            <a:off x="1228500" y="2150875"/>
+            <a:ext cx="6686979" cy="4205475"/>
+          </a:xfrm>
+          <a:prstGeom prst="rect">
+            <a:avLst/>
+          </a:prstGeom>
+          <a:noFill/>
+          <a:ln>
+            <a:noFill/>
+          </a:ln>
+        </p:spPr>
+      </p:pic>
+    </p:spTree>
+  </p:cSld>
+  <p:clrMapOvr>
+    <a:masterClrMapping/>
+  </p:clrMapOvr>
+</p:sld>
+</file>
+
+<file path=ppt/slides/slide14.xml><?xml version="1.0" encoding="utf-8"?>
+<p:sld xmlns:a="http://schemas.openxmlformats.org/drawingml/2006/main" xmlns:r="http://schemas.openxmlformats.org/officeDocument/2006/relationships" xmlns:mc="http://schemas.openxmlformats.org/markup-compatibility/2006" xmlns:mv="urn:schemas-microsoft-com:mac:vml" xmlns:p="http://schemas.openxmlformats.org/presentationml/2006/main" xmlns:c="http://schemas.openxmlformats.org/drawingml/2006/chart" xmlns:dgm="http://schemas.openxmlformats.org/drawingml/2006/diagram" xmlns:o="urn:schemas-microsoft-com:office:office" xmlns:v="urn:schemas-microsoft-com:vml" xmlns:pvml="urn:schemas-microsoft-com:office:powerpoint" xmlns:com="http://schemas.openxmlformats.org/drawingml/2006/compatibility" xmlns:p14="http://schemas.microsoft.com/office/powerpoint/2010/main" xmlns:p15="http://schemas.microsoft.com/office/powerpoint/2012/main" xmlns:ahyp="http://schemas.microsoft.com/office/drawing/2018/hyperlinkcolor">
+  <p:cSld>
+    <p:bg>
+      <p:bgPr>
+        <a:blipFill>
+          <a:blip r:embed="rId3">
+            <a:alphaModFix/>
+          </a:blip>
+          <a:stretch>
+            <a:fillRect/>
+          </a:stretch>
+        </a:blipFill>
+      </p:bgPr>
+    </p:bg>
+    <p:spTree>
+      <p:nvGrpSpPr>
+        <p:cNvPr id="181" name="Shape 181"/>
+        <p:cNvGrpSpPr/>
+        <p:nvPr/>
+      </p:nvGrpSpPr>
+      <p:grpSpPr>
+        <a:xfrm>
+          <a:off x="0" y="0"/>
+          <a:ext cx="0" cy="0"/>
+          <a:chOff x="0" y="0"/>
+          <a:chExt cx="0" cy="0"/>
+        </a:xfrm>
+      </p:grpSpPr>
+      <p:sp>
+        <p:nvSpPr>
+          <p:cNvPr id="182" name="Google Shape;182;g1ec41259802_0_23"/>
+          <p:cNvSpPr txBox="1"/>
+          <p:nvPr>
+            <p:ph idx="12" type="sldNum"/>
+          </p:nvPr>
+        </p:nvSpPr>
+        <p:spPr>
+          <a:xfrm>
+            <a:off x="6457950" y="6356350"/>
+            <a:ext cx="2057400" cy="365100"/>
+          </a:xfrm>
+          <a:prstGeom prst="rect">
+            <a:avLst/>
+          </a:prstGeom>
+          <a:noFill/>
+          <a:ln>
+            <a:noFill/>
+          </a:ln>
+        </p:spPr>
+        <p:txBody>
+          <a:bodyPr anchorCtr="0" anchor="ctr" bIns="45700" lIns="91425" spcFirstLastPara="1" rIns="91425" wrap="square" tIns="45700">
+            <a:noAutofit/>
+          </a:bodyPr>
+          <a:lstStyle/>
+          <a:p>
+            <a:pPr indent="0" lvl="0" marL="0" rtl="0" algn="r">
+              <a:lnSpc>
+                <a:spcPct val="100000"/>
+              </a:lnSpc>
+              <a:spcBef>
+                <a:spcPts val="0"/>
+              </a:spcBef>
+              <a:spcAft>
+                <a:spcPts val="0"/>
+              </a:spcAft>
+              <a:buSzPts val="1200"/>
+              <a:buNone/>
+            </a:pPr>
+            <a:fld id="{00000000-1234-1234-1234-123412341234}" type="slidenum">
+              <a:rPr lang="fr-FR"/>
+              <a:t>‹#›</a:t>
+            </a:fld>
+            <a:endParaRPr/>
+          </a:p>
+        </p:txBody>
+      </p:sp>
+      <p:pic>
+        <p:nvPicPr>
+          <p:cNvPr id="183" name="Google Shape;183;g1ec41259802_0_23"/>
+          <p:cNvPicPr preferRelativeResize="0"/>
+          <p:nvPr/>
+        </p:nvPicPr>
+        <p:blipFill>
+          <a:blip r:embed="rId4">
+            <a:alphaModFix/>
+          </a:blip>
+          <a:stretch>
+            <a:fillRect/>
+          </a:stretch>
+        </p:blipFill>
+        <p:spPr>
+          <a:xfrm>
+            <a:off x="741662" y="1526800"/>
+            <a:ext cx="7660674" cy="4829550"/>
+          </a:xfrm>
+          <a:prstGeom prst="rect">
+            <a:avLst/>
+          </a:prstGeom>
+          <a:noFill/>
+          <a:ln>
+            <a:noFill/>
+          </a:ln>
+        </p:spPr>
+      </p:pic>
+    </p:spTree>
+  </p:cSld>
+  <p:clrMapOvr>
+    <a:masterClrMapping/>
+  </p:clrMapOvr>
+</p:sld>
+</file>
+
+<file path=ppt/slides/slide15.xml><?xml version="1.0" encoding="utf-8"?>
+<p:sld xmlns:a="http://schemas.openxmlformats.org/drawingml/2006/main" xmlns:r="http://schemas.openxmlformats.org/officeDocument/2006/relationships" xmlns:mc="http://schemas.openxmlformats.org/markup-compatibility/2006" xmlns:mv="urn:schemas-microsoft-com:mac:vml" xmlns:p="http://schemas.openxmlformats.org/presentationml/2006/main" xmlns:c="http://schemas.openxmlformats.org/drawingml/2006/chart" xmlns:dgm="http://schemas.openxmlformats.org/drawingml/2006/diagram" xmlns:o="urn:schemas-microsoft-com:office:office" xmlns:v="urn:schemas-microsoft-com:vml" xmlns:pvml="urn:schemas-microsoft-com:office:powerpoint" xmlns:com="http://schemas.openxmlformats.org/drawingml/2006/compatibility" xmlns:p14="http://schemas.microsoft.com/office/powerpoint/2010/main" xmlns:p15="http://schemas.microsoft.com/office/powerpoint/2012/main" xmlns:ahyp="http://schemas.microsoft.com/office/drawing/2018/hyperlinkcolor">
+  <p:cSld>
+    <p:bg>
+      <p:bgPr>
+        <a:blipFill>
+          <a:blip r:embed="rId3">
+            <a:alphaModFix/>
+          </a:blip>
+          <a:stretch>
+            <a:fillRect/>
+          </a:stretch>
+        </a:blipFill>
+      </p:bgPr>
+    </p:bg>
+    <p:spTree>
+      <p:nvGrpSpPr>
+        <p:cNvPr id="187" name="Shape 187"/>
+        <p:cNvGrpSpPr/>
+        <p:nvPr/>
+      </p:nvGrpSpPr>
+      <p:grpSpPr>
+        <a:xfrm>
+          <a:off x="0" y="0"/>
+          <a:ext cx="0" cy="0"/>
+          <a:chOff x="0" y="0"/>
+          <a:chExt cx="0" cy="0"/>
+        </a:xfrm>
+      </p:grpSpPr>
+      <p:sp>
+        <p:nvSpPr>
+          <p:cNvPr id="188" name="Google Shape;188;p4"/>
           <p:cNvSpPr txBox="1"/>
           <p:nvPr>
             <p:ph idx="12" type="sldNum"/>
@@ -18973,6 +19814,141 @@
               <a:t>‹#›</a:t>
             </a:fld>
             <a:endParaRPr/>
+          </a:p>
+        </p:txBody>
+      </p:sp>
+      <p:sp>
+        <p:nvSpPr>
+          <p:cNvPr id="189" name="Google Shape;189;p4"/>
+          <p:cNvSpPr txBox="1"/>
+          <p:nvPr/>
+        </p:nvSpPr>
+        <p:spPr>
+          <a:xfrm>
+            <a:off x="0" y="1526600"/>
+            <a:ext cx="9144000" cy="615600"/>
+          </a:xfrm>
+          <a:prstGeom prst="rect">
+            <a:avLst/>
+          </a:prstGeom>
+          <a:noFill/>
+          <a:ln>
+            <a:noFill/>
+          </a:ln>
+        </p:spPr>
+        <p:txBody>
+          <a:bodyPr anchorCtr="0" anchor="t" bIns="91425" lIns="91425" spcFirstLastPara="1" rIns="91425" wrap="square" tIns="91425">
+            <a:spAutoFit/>
+          </a:bodyPr>
+          <a:lstStyle/>
+          <a:p>
+            <a:pPr indent="0" lvl="0" marL="0" rtl="0" algn="ctr">
+              <a:spcBef>
+                <a:spcPts val="0"/>
+              </a:spcBef>
+              <a:spcAft>
+                <a:spcPts val="0"/>
+              </a:spcAft>
+              <a:buNone/>
+            </a:pPr>
+            <a:r>
+              <a:rPr b="1" lang="fr-FR" sz="2800">
+                <a:solidFill>
+                  <a:schemeClr val="dk1"/>
+                </a:solidFill>
+                <a:latin typeface="PT Sans"/>
+                <a:ea typeface="PT Sans"/>
+                <a:cs typeface="PT Sans"/>
+                <a:sym typeface="PT Sans"/>
+              </a:rPr>
+              <a:t>Bibliography</a:t>
+            </a:r>
+            <a:endParaRPr b="1" sz="2800">
+              <a:solidFill>
+                <a:schemeClr val="dk1"/>
+              </a:solidFill>
+              <a:latin typeface="PT Sans"/>
+              <a:ea typeface="PT Sans"/>
+              <a:cs typeface="PT Sans"/>
+              <a:sym typeface="PT Sans"/>
+            </a:endParaRPr>
+          </a:p>
+        </p:txBody>
+      </p:sp>
+      <p:sp>
+        <p:nvSpPr>
+          <p:cNvPr id="190" name="Google Shape;190;p4"/>
+          <p:cNvSpPr txBox="1"/>
+          <p:nvPr/>
+        </p:nvSpPr>
+        <p:spPr>
+          <a:xfrm>
+            <a:off x="0" y="2142200"/>
+            <a:ext cx="9144000" cy="1687200"/>
+          </a:xfrm>
+          <a:prstGeom prst="rect">
+            <a:avLst/>
+          </a:prstGeom>
+          <a:noFill/>
+          <a:ln>
+            <a:noFill/>
+          </a:ln>
+        </p:spPr>
+        <p:txBody>
+          <a:bodyPr anchorCtr="0" anchor="ctr" bIns="45700" lIns="91425" spcFirstLastPara="1" rIns="91425" wrap="square" tIns="45700">
+            <a:noAutofit/>
+          </a:bodyPr>
+          <a:lstStyle/>
+          <a:p>
+            <a:pPr indent="-342900" lvl="0" marL="342900" marR="0" rtl="0" algn="l">
+              <a:lnSpc>
+                <a:spcPct val="100000"/>
+              </a:lnSpc>
+              <a:spcBef>
+                <a:spcPts val="0"/>
+              </a:spcBef>
+              <a:spcAft>
+                <a:spcPts val="0"/>
+              </a:spcAft>
+              <a:buClr>
+                <a:schemeClr val="dk1"/>
+              </a:buClr>
+              <a:buSzPts val="2400"/>
+              <a:buChar char="•"/>
+            </a:pPr>
+            <a:r>
+              <a:rPr lang="fr-FR" sz="2400">
+                <a:solidFill>
+                  <a:schemeClr val="dk1"/>
+                </a:solidFill>
+                <a:latin typeface="PT Sans"/>
+                <a:ea typeface="PT Sans"/>
+                <a:cs typeface="PT Sans"/>
+                <a:sym typeface="PT Sans"/>
+              </a:rPr>
+              <a:t>https://www.kaggle.com/datasets/NUFORC/ufo-sightings - </a:t>
+            </a:r>
+            <a:r>
+              <a:rPr b="1" lang="fr-FR" sz="2400">
+                <a:solidFill>
+                  <a:schemeClr val="dk1"/>
+                </a:solidFill>
+                <a:latin typeface="PT Sans"/>
+                <a:ea typeface="PT Sans"/>
+                <a:cs typeface="PT Sans"/>
+                <a:sym typeface="PT Sans"/>
+              </a:rPr>
+              <a:t>Used Dataset</a:t>
+            </a:r>
+            <a:endParaRPr b="1" sz="2400">
+              <a:solidFill>
+                <a:schemeClr val="dk1"/>
+              </a:solidFill>
+              <a:latin typeface="PT Sans"/>
+              <a:ea typeface="PT Sans"/>
+              <a:cs typeface="PT Sans"/>
+              <a:sym typeface="PT Sans"/>
+            </a:endParaRPr>
           </a:p>
         </p:txBody>
       </p:sp>
@@ -19181,8 +20157,8 @@
         </p:nvSpPr>
         <p:spPr>
           <a:xfrm>
-            <a:off x="633412" y="1899072"/>
-            <a:ext cx="7886700" cy="4328691"/>
+            <a:off x="0" y="2142200"/>
+            <a:ext cx="9144000" cy="4085100"/>
           </a:xfrm>
           <a:prstGeom prst="rect">
             <a:avLst/>
@@ -19237,7 +20213,19 @@
                 <a:cs typeface="PT Sans"/>
                 <a:sym typeface="PT Sans"/>
               </a:rPr>
-              <a:t> Analyze reports about UFO sightings over the last century</a:t>
+              <a:t> </a:t>
+            </a:r>
+            <a:r>
+              <a:rPr lang="fr-FR" sz="2400">
+                <a:solidFill>
+                  <a:schemeClr val="dk1"/>
+                </a:solidFill>
+                <a:latin typeface="PT Sans"/>
+                <a:ea typeface="PT Sans"/>
+                <a:cs typeface="PT Sans"/>
+                <a:sym typeface="PT Sans"/>
+              </a:rPr>
+              <a:t>Why do people see UFOs in the first place? Do aliens exist?</a:t>
             </a:r>
             <a:endParaRPr b="0" i="0" sz="2400" u="none" cap="none" strike="noStrike">
               <a:solidFill>
@@ -19535,6 +20523,64 @@
           </a:p>
         </p:txBody>
       </p:sp>
+      <p:sp>
+        <p:nvSpPr>
+          <p:cNvPr id="95" name="Google Shape;95;p2"/>
+          <p:cNvSpPr txBox="1"/>
+          <p:nvPr/>
+        </p:nvSpPr>
+        <p:spPr>
+          <a:xfrm>
+            <a:off x="0" y="1526600"/>
+            <a:ext cx="9144000" cy="615600"/>
+          </a:xfrm>
+          <a:prstGeom prst="rect">
+            <a:avLst/>
+          </a:prstGeom>
+          <a:noFill/>
+          <a:ln>
+            <a:noFill/>
+          </a:ln>
+        </p:spPr>
+        <p:txBody>
+          <a:bodyPr anchorCtr="0" anchor="t" bIns="91425" lIns="91425" spcFirstLastPara="1" rIns="91425" wrap="square" tIns="91425">
+            <a:spAutoFit/>
+          </a:bodyPr>
+          <a:lstStyle/>
+          <a:p>
+            <a:pPr indent="0" lvl="0" marL="0" rtl="0" algn="ctr">
+              <a:spcBef>
+                <a:spcPts val="0"/>
+              </a:spcBef>
+              <a:spcAft>
+                <a:spcPts val="0"/>
+              </a:spcAft>
+              <a:buNone/>
+            </a:pPr>
+            <a:r>
+              <a:rPr b="1" lang="fr-FR" sz="2800">
+                <a:solidFill>
+                  <a:schemeClr val="dk1"/>
+                </a:solidFill>
+                <a:latin typeface="PT Sans"/>
+                <a:ea typeface="PT Sans"/>
+                <a:cs typeface="PT Sans"/>
+                <a:sym typeface="PT Sans"/>
+              </a:rPr>
+              <a:t>Overview of the Analysis</a:t>
+            </a:r>
+            <a:endParaRPr b="1" sz="2800">
+              <a:solidFill>
+                <a:schemeClr val="dk1"/>
+              </a:solidFill>
+              <a:latin typeface="PT Sans"/>
+              <a:ea typeface="PT Sans"/>
+              <a:cs typeface="PT Sans"/>
+              <a:sym typeface="PT Sans"/>
+            </a:endParaRPr>
+          </a:p>
+        </p:txBody>
+      </p:sp>
     </p:spTree>
   </p:cSld>
   <p:clrMapOvr>
@@ -19560,7 +20606,7 @@
     </p:bg>
     <p:spTree>
       <p:nvGrpSpPr>
-        <p:cNvPr id="99" name="Shape 99"/>
+        <p:cNvPr id="100" name="Shape 100"/>
         <p:cNvGrpSpPr/>
         <p:nvPr/>
       </p:nvGrpSpPr>
@@ -19574,7 +20620,7 @@
       </p:grpSpPr>
       <p:sp>
         <p:nvSpPr>
-          <p:cNvPr id="100" name="Google Shape;100;p3"/>
+          <p:cNvPr id="101" name="Google Shape;101;p3"/>
           <p:cNvSpPr txBox="1"/>
           <p:nvPr>
             <p:ph idx="12" type="sldNum"/>
@@ -19622,14 +20668,14 @@
       </p:sp>
       <p:sp>
         <p:nvSpPr>
-          <p:cNvPr id="101" name="Google Shape;101;p3"/>
+          <p:cNvPr id="102" name="Google Shape;102;p3"/>
           <p:cNvSpPr txBox="1"/>
           <p:nvPr/>
         </p:nvSpPr>
         <p:spPr>
           <a:xfrm>
-            <a:off x="628662" y="1872422"/>
-            <a:ext cx="7886700" cy="4328700"/>
+            <a:off x="25" y="2142200"/>
+            <a:ext cx="9144000" cy="2370900"/>
           </a:xfrm>
           <a:prstGeom prst="rect">
             <a:avLst/>
@@ -19752,13 +20798,13 @@
       </p:sp>
       <p:sp>
         <p:nvSpPr>
-          <p:cNvPr id="102" name="Google Shape;102;p3"/>
+          <p:cNvPr id="103" name="Google Shape;103;p3"/>
           <p:cNvSpPr txBox="1"/>
           <p:nvPr/>
         </p:nvSpPr>
         <p:spPr>
           <a:xfrm>
-            <a:off x="50800" y="1872425"/>
+            <a:off x="25" y="1526600"/>
             <a:ext cx="9144000" cy="615600"/>
           </a:xfrm>
           <a:prstGeom prst="rect">
@@ -19789,10 +20835,10 @@
                 <a:solidFill>
                   <a:schemeClr val="dk1"/>
                 </a:solidFill>
-                <a:latin typeface="Calibri"/>
-                <a:ea typeface="Calibri"/>
-                <a:cs typeface="Calibri"/>
-                <a:sym typeface="Calibri"/>
+                <a:latin typeface="PT Sans"/>
+                <a:ea typeface="PT Sans"/>
+                <a:cs typeface="PT Sans"/>
+                <a:sym typeface="PT Sans"/>
               </a:rPr>
               <a:t>Data Summary</a:t>
             </a:r>
@@ -19800,10 +20846,10 @@
               <a:solidFill>
                 <a:schemeClr val="dk1"/>
               </a:solidFill>
-              <a:latin typeface="Calibri"/>
-              <a:ea typeface="Calibri"/>
-              <a:cs typeface="Calibri"/>
-              <a:sym typeface="Calibri"/>
+              <a:latin typeface="PT Sans"/>
+              <a:ea typeface="PT Sans"/>
+              <a:cs typeface="PT Sans"/>
+              <a:sym typeface="PT Sans"/>
             </a:endParaRPr>
           </a:p>
         </p:txBody>
@@ -19833,7 +20879,7 @@
     </p:bg>
     <p:spTree>
       <p:nvGrpSpPr>
-        <p:cNvPr id="107" name="Shape 107"/>
+        <p:cNvPr id="108" name="Shape 108"/>
         <p:cNvGrpSpPr/>
         <p:nvPr/>
       </p:nvGrpSpPr>
@@ -19847,7 +20893,7 @@
       </p:grpSpPr>
       <p:sp>
         <p:nvSpPr>
-          <p:cNvPr id="108" name="Google Shape;108;g1eb480128fd_0_1"/>
+          <p:cNvPr id="109" name="Google Shape;109;g1eb480128fd_0_1"/>
           <p:cNvSpPr txBox="1"/>
           <p:nvPr>
             <p:ph idx="12" type="sldNum"/>
@@ -19895,7 +20941,7 @@
       </p:sp>
       <p:pic>
         <p:nvPicPr>
-          <p:cNvPr id="109" name="Google Shape;109;g1eb480128fd_0_1"/>
+          <p:cNvPr id="110" name="Google Shape;110;g1eb480128fd_0_1"/>
           <p:cNvPicPr preferRelativeResize="0"/>
           <p:nvPr/>
         </p:nvPicPr>
@@ -19909,8 +20955,8 @@
         </p:blipFill>
         <p:spPr>
           <a:xfrm>
-            <a:off x="747963" y="1534750"/>
-            <a:ext cx="7648075" cy="4821599"/>
+            <a:off x="733175" y="1516100"/>
+            <a:ext cx="7677651" cy="4840249"/>
           </a:xfrm>
           <a:prstGeom prst="rect">
             <a:avLst/>
@@ -19946,7 +20992,7 @@
     </p:bg>
     <p:spTree>
       <p:nvGrpSpPr>
-        <p:cNvPr id="114" name="Shape 114"/>
+        <p:cNvPr id="115" name="Shape 115"/>
         <p:cNvGrpSpPr/>
         <p:nvPr/>
       </p:nvGrpSpPr>
@@ -19960,7 +21006,7 @@
       </p:grpSpPr>
       <p:sp>
         <p:nvSpPr>
-          <p:cNvPr id="115" name="Google Shape;115;g1ec41259802_0_8"/>
+          <p:cNvPr id="116" name="Google Shape;116;g1ec41259802_0_8"/>
           <p:cNvSpPr txBox="1"/>
           <p:nvPr>
             <p:ph idx="12" type="sldNum"/>
@@ -20008,7 +21054,7 @@
       </p:sp>
       <p:pic>
         <p:nvPicPr>
-          <p:cNvPr id="116" name="Google Shape;116;g1ec41259802_0_8"/>
+          <p:cNvPr id="117" name="Google Shape;117;g1ec41259802_0_8"/>
           <p:cNvPicPr preferRelativeResize="0"/>
           <p:nvPr/>
         </p:nvPicPr>
@@ -20022,8 +21068,8 @@
         </p:blipFill>
         <p:spPr>
           <a:xfrm>
-            <a:off x="759475" y="1549250"/>
-            <a:ext cx="7625050" cy="4807099"/>
+            <a:off x="755050" y="1543675"/>
+            <a:ext cx="7633900" cy="4812675"/>
           </a:xfrm>
           <a:prstGeom prst="rect">
             <a:avLst/>
@@ -20059,7 +21105,7 @@
     </p:bg>
     <p:spTree>
       <p:nvGrpSpPr>
-        <p:cNvPr id="121" name="Shape 121"/>
+        <p:cNvPr id="122" name="Shape 122"/>
         <p:cNvGrpSpPr/>
         <p:nvPr/>
       </p:nvGrpSpPr>
@@ -20073,7 +21119,7 @@
       </p:grpSpPr>
       <p:sp>
         <p:nvSpPr>
-          <p:cNvPr id="122" name="Google Shape;122;g1ec41259802_0_15"/>
+          <p:cNvPr id="123" name="Google Shape;123;g1ec41259802_0_15"/>
           <p:cNvSpPr txBox="1"/>
           <p:nvPr>
             <p:ph idx="12" type="sldNum"/>
@@ -20121,7 +21167,7 @@
       </p:sp>
       <p:pic>
         <p:nvPicPr>
-          <p:cNvPr id="123" name="Google Shape;123;g1ec41259802_0_15"/>
+          <p:cNvPr id="124" name="Google Shape;124;g1ec41259802_0_15"/>
           <p:cNvPicPr preferRelativeResize="0"/>
           <p:nvPr/>
         </p:nvPicPr>
@@ -20135,8 +21181,8 @@
         </p:blipFill>
         <p:spPr>
           <a:xfrm>
-            <a:off x="736338" y="1520075"/>
-            <a:ext cx="7671326" cy="4836275"/>
+            <a:off x="748362" y="1535250"/>
+            <a:ext cx="7647275" cy="4821101"/>
           </a:xfrm>
           <a:prstGeom prst="rect">
             <a:avLst/>
@@ -20172,7 +21218,7 @@
     </p:bg>
     <p:spTree>
       <p:nvGrpSpPr>
-        <p:cNvPr id="128" name="Shape 128"/>
+        <p:cNvPr id="129" name="Shape 129"/>
         <p:cNvGrpSpPr/>
         <p:nvPr/>
       </p:nvGrpSpPr>
@@ -20186,7 +21232,7 @@
       </p:grpSpPr>
       <p:sp>
         <p:nvSpPr>
-          <p:cNvPr id="129" name="Google Shape;129;g29b2f7f38cc_0_10"/>
+          <p:cNvPr id="130" name="Google Shape;130;g29b2f7f38cc_0_10"/>
           <p:cNvSpPr txBox="1"/>
           <p:nvPr>
             <p:ph idx="12" type="sldNum"/>
@@ -20234,7 +21280,7 @@
       </p:sp>
       <p:pic>
         <p:nvPicPr>
-          <p:cNvPr id="130" name="Google Shape;130;g29b2f7f38cc_0_10"/>
+          <p:cNvPr id="131" name="Google Shape;131;g29b2f7f38cc_0_10"/>
           <p:cNvPicPr preferRelativeResize="0"/>
           <p:nvPr/>
         </p:nvPicPr>
@@ -20248,8 +21294,8 @@
         </p:blipFill>
         <p:spPr>
           <a:xfrm>
-            <a:off x="266000" y="1572950"/>
-            <a:ext cx="8612000" cy="4783399"/>
+            <a:off x="239637" y="1543675"/>
+            <a:ext cx="8664726" cy="4812675"/>
           </a:xfrm>
           <a:prstGeom prst="rect">
             <a:avLst/>
@@ -20285,7 +21331,7 @@
     </p:bg>
     <p:spTree>
       <p:nvGrpSpPr>
-        <p:cNvPr id="135" name="Shape 135"/>
+        <p:cNvPr id="136" name="Shape 136"/>
         <p:cNvGrpSpPr/>
         <p:nvPr/>
       </p:nvGrpSpPr>
@@ -20299,7 +21345,7 @@
       </p:grpSpPr>
       <p:sp>
         <p:nvSpPr>
-          <p:cNvPr id="136" name="Google Shape;136;g28b56c42b40_0_0"/>
+          <p:cNvPr id="137" name="Google Shape;137;g28b56c42b40_0_0"/>
           <p:cNvSpPr txBox="1"/>
           <p:nvPr>
             <p:ph idx="12" type="sldNum"/>
@@ -20347,7 +21393,7 @@
       </p:sp>
       <p:pic>
         <p:nvPicPr>
-          <p:cNvPr id="137" name="Google Shape;137;g28b56c42b40_0_0"/>
+          <p:cNvPr id="138" name="Google Shape;138;g28b56c42b40_0_0"/>
           <p:cNvPicPr preferRelativeResize="0"/>
           <p:nvPr/>
         </p:nvPicPr>
@@ -20361,8 +21407,8 @@
         </p:blipFill>
         <p:spPr>
           <a:xfrm>
-            <a:off x="735000" y="1518375"/>
-            <a:ext cx="7674001" cy="4837974"/>
+            <a:off x="748387" y="1535250"/>
+            <a:ext cx="7647224" cy="4821101"/>
           </a:xfrm>
           <a:prstGeom prst="rect">
             <a:avLst/>
@@ -20398,7 +21444,7 @@
     </p:bg>
     <p:spTree>
       <p:nvGrpSpPr>
-        <p:cNvPr id="142" name="Shape 142"/>
+        <p:cNvPr id="143" name="Shape 143"/>
         <p:cNvGrpSpPr/>
         <p:nvPr/>
       </p:nvGrpSpPr>
@@ -20412,7 +21458,7 @@
       </p:grpSpPr>
       <p:sp>
         <p:nvSpPr>
-          <p:cNvPr id="143" name="Google Shape;143;g28b52198a15_0_1"/>
+          <p:cNvPr id="144" name="Google Shape;144;g28b52198a15_0_1"/>
           <p:cNvSpPr txBox="1"/>
           <p:nvPr>
             <p:ph idx="12" type="sldNum"/>
@@ -20460,7 +21506,7 @@
       </p:sp>
       <p:pic>
         <p:nvPicPr>
-          <p:cNvPr id="144" name="Google Shape;144;g28b52198a15_0_1"/>
+          <p:cNvPr id="145" name="Google Shape;145;g28b52198a15_0_1"/>
           <p:cNvPicPr preferRelativeResize="0"/>
           <p:nvPr/>
         </p:nvPicPr>
@@ -20474,8 +21520,8 @@
         </p:blipFill>
         <p:spPr>
           <a:xfrm>
-            <a:off x="755050" y="1543675"/>
-            <a:ext cx="7633900" cy="4812675"/>
+            <a:off x="748375" y="1535250"/>
+            <a:ext cx="7647249" cy="4821101"/>
           </a:xfrm>
           <a:prstGeom prst="rect">
             <a:avLst/>
@@ -20774,6 +21820,285 @@
 </file>
 
 <file path=ppt/theme/theme2.xml><?xml version="1.0" encoding="utf-8"?>
+<a:theme xmlns:a="http://schemas.openxmlformats.org/drawingml/2006/main" xmlns:r="http://schemas.openxmlformats.org/officeDocument/2006/relationships" name="Тема Office">
+  <a:themeElements>
+    <a:clrScheme name="Стандартная">
+      <a:dk1>
+        <a:srgbClr val="000000"/>
+      </a:dk1>
+      <a:lt1>
+        <a:srgbClr val="FFFFFF"/>
+      </a:lt1>
+      <a:dk2>
+        <a:srgbClr val="44546A"/>
+      </a:dk2>
+      <a:lt2>
+        <a:srgbClr val="E7E6E6"/>
+      </a:lt2>
+      <a:accent1>
+        <a:srgbClr val="4472C4"/>
+      </a:accent1>
+      <a:accent2>
+        <a:srgbClr val="ED7D31"/>
+      </a:accent2>
+      <a:accent3>
+        <a:srgbClr val="A5A5A5"/>
+      </a:accent3>
+      <a:accent4>
+        <a:srgbClr val="FFC000"/>
+      </a:accent4>
+      <a:accent5>
+        <a:srgbClr val="5B9BD5"/>
+      </a:accent5>
+      <a:accent6>
+        <a:srgbClr val="70AD47"/>
+      </a:accent6>
+      <a:hlink>
+        <a:srgbClr val="0563C1"/>
+      </a:hlink>
+      <a:folHlink>
+        <a:srgbClr val="954F72"/>
+      </a:folHlink>
+    </a:clrScheme>
+    <a:fontScheme name="Office">
+      <a:majorFont>
+        <a:latin typeface="Arial"/>
+        <a:ea typeface=""/>
+        <a:cs typeface=""/>
+        <a:font script="Jpan" typeface="ＭＳ Ｐゴシック"/>
+        <a:font script="Hang" typeface="맑은 고딕"/>
+        <a:font script="Hans" typeface="宋体"/>
+        <a:font script="Hant" typeface="新細明體"/>
+        <a:font script="Arab" typeface="Times New Roman"/>
+        <a:font script="Hebr" typeface="Times New Roman"/>
+        <a:font script="Thai" typeface="Angsana New"/>
+        <a:font script="Ethi" typeface="Nyala"/>
+        <a:font script="Beng" typeface="Vrinda"/>
+        <a:font script="Gujr" typeface="Shruti"/>
+        <a:font script="Khmr" typeface="MoolBoran"/>
+        <a:font script="Knda" typeface="Tunga"/>
+        <a:font script="Guru" typeface="Raavi"/>
+        <a:font script="Cans" typeface="Euphemia"/>
+        <a:font script="Cher" typeface="Plantagenet Cherokee"/>
+        <a:font script="Yiii" typeface="Microsoft Yi Baiti"/>
+        <a:font script="Tibt" typeface="Microsoft Himalaya"/>
+        <a:font script="Thaa" typeface="MV Boli"/>
+        <a:font script="Deva" typeface="Mangal"/>
+        <a:font script="Telu" typeface="Gautami"/>
+        <a:font script="Taml" typeface="Latha"/>
+        <a:font script="Syrc" typeface="Estrangelo Edessa"/>
+        <a:font script="Orya" typeface="Kalinga"/>
+        <a:font script="Mlym" typeface="Kartika"/>
+        <a:font script="Laoo" typeface="DokChampa"/>
+        <a:font script="Sinh" typeface="Iskoola Pota"/>
+        <a:font script="Mong" typeface="Mongolian Baiti"/>
+        <a:font script="Viet" typeface="Times New Roman"/>
+        <a:font script="Uigh" typeface="Microsoft Uighur"/>
+        <a:font script="Geor" typeface="Sylfaen"/>
+      </a:majorFont>
+      <a:minorFont>
+        <a:latin typeface="Arial"/>
+        <a:ea typeface=""/>
+        <a:cs typeface=""/>
+        <a:font script="Jpan" typeface="ＭＳ Ｐゴシック"/>
+        <a:font script="Hang" typeface="맑은 고딕"/>
+        <a:font script="Hans" typeface="宋体"/>
+        <a:font script="Hant" typeface="新細明體"/>
+        <a:font script="Arab" typeface="Arial"/>
+        <a:font script="Hebr" typeface="Arial"/>
+        <a:font script="Thai" typeface="Cordia New"/>
+        <a:font script="Ethi" typeface="Nyala"/>
+        <a:font script="Beng" typeface="Vrinda"/>
+        <a:font script="Gujr" typeface="Shruti"/>
+        <a:font script="Khmr" typeface="DaunPenh"/>
+        <a:font script="Knda" typeface="Tunga"/>
+        <a:font script="Guru" typeface="Raavi"/>
+        <a:font script="Cans" typeface="Euphemia"/>
+        <a:font script="Cher" typeface="Plantagenet Cherokee"/>
+        <a:font script="Yiii" typeface="Microsoft Yi Baiti"/>
+        <a:font script="Tibt" typeface="Microsoft Himalaya"/>
+        <a:font script="Thaa" typeface="MV Boli"/>
+        <a:font script="Deva" typeface="Mangal"/>
+        <a:font script="Telu" typeface="Gautami"/>
+        <a:font script="Taml" typeface="Latha"/>
+        <a:font script="Syrc" typeface="Estrangelo Edessa"/>
+        <a:font script="Orya" typeface="Kalinga"/>
+        <a:font script="Mlym" typeface="Kartika"/>
+        <a:font script="Laoo" typeface="DokChampa"/>
+        <a:font script="Sinh" typeface="Iskoola Pota"/>
+        <a:font script="Mong" typeface="Mongolian Baiti"/>
+        <a:font script="Viet" typeface="Arial"/>
+        <a:font script="Uigh" typeface="Microsoft Uighur"/>
+        <a:font script="Geor" typeface="Sylfaen"/>
+      </a:minorFont>
+    </a:fontScheme>
+    <a:fmtScheme name="Office">
+      <a:fillStyleLst>
+        <a:solidFill>
+          <a:schemeClr val="phClr"/>
+        </a:solidFill>
+        <a:gradFill rotWithShape="1">
+          <a:gsLst>
+            <a:gs pos="0">
+              <a:schemeClr val="phClr">
+                <a:tint val="50000"/>
+                <a:satMod val="300000"/>
+              </a:schemeClr>
+            </a:gs>
+            <a:gs pos="35000">
+              <a:schemeClr val="phClr">
+                <a:tint val="37000"/>
+                <a:satMod val="300000"/>
+              </a:schemeClr>
+            </a:gs>
+            <a:gs pos="100000">
+              <a:schemeClr val="phClr">
+                <a:tint val="15000"/>
+                <a:satMod val="350000"/>
+              </a:schemeClr>
+            </a:gs>
+          </a:gsLst>
+          <a:lin ang="16200000" scaled="1"/>
+        </a:gradFill>
+        <a:gradFill rotWithShape="1">
+          <a:gsLst>
+            <a:gs pos="0">
+              <a:schemeClr val="phClr">
+                <a:tint val="100000"/>
+                <a:shade val="100000"/>
+                <a:satMod val="130000"/>
+              </a:schemeClr>
+            </a:gs>
+            <a:gs pos="100000">
+              <a:schemeClr val="phClr">
+                <a:tint val="50000"/>
+                <a:shade val="100000"/>
+                <a:satMod val="350000"/>
+              </a:schemeClr>
+            </a:gs>
+          </a:gsLst>
+          <a:lin ang="16200000" scaled="0"/>
+        </a:gradFill>
+      </a:fillStyleLst>
+      <a:lnStyleLst>
+        <a:ln w="9525" cap="flat" cmpd="sng" algn="ctr">
+          <a:solidFill>
+            <a:schemeClr val="phClr">
+              <a:shade val="95000"/>
+              <a:satMod val="105000"/>
+            </a:schemeClr>
+          </a:solidFill>
+          <a:prstDash val="solid"/>
+        </a:ln>
+        <a:ln w="25400" cap="flat" cmpd="sng" algn="ctr">
+          <a:solidFill>
+            <a:schemeClr val="phClr"/>
+          </a:solidFill>
+          <a:prstDash val="solid"/>
+        </a:ln>
+        <a:ln w="38100" cap="flat" cmpd="sng" algn="ctr">
+          <a:solidFill>
+            <a:schemeClr val="phClr"/>
+          </a:solidFill>
+          <a:prstDash val="solid"/>
+        </a:ln>
+      </a:lnStyleLst>
+      <a:effectStyleLst>
+        <a:effectStyle>
+          <a:effectLst>
+            <a:outerShdw blurRad="40000" dist="20000" dir="5400000" rotWithShape="0">
+              <a:srgbClr val="000000">
+                <a:alpha val="38000"/>
+              </a:srgbClr>
+            </a:outerShdw>
+          </a:effectLst>
+        </a:effectStyle>
+        <a:effectStyle>
+          <a:effectLst>
+            <a:outerShdw blurRad="40000" dist="23000" dir="5400000" rotWithShape="0">
+              <a:srgbClr val="000000">
+                <a:alpha val="35000"/>
+              </a:srgbClr>
+            </a:outerShdw>
+          </a:effectLst>
+        </a:effectStyle>
+        <a:effectStyle>
+          <a:effectLst>
+            <a:outerShdw blurRad="40000" dist="23000" dir="5400000" rotWithShape="0">
+              <a:srgbClr val="000000">
+                <a:alpha val="35000"/>
+              </a:srgbClr>
+            </a:outerShdw>
+          </a:effectLst>
+          <a:scene3d>
+            <a:camera prst="orthographicFront">
+              <a:rot lat="0" lon="0" rev="0"/>
+            </a:camera>
+            <a:lightRig rig="threePt" dir="t">
+              <a:rot lat="0" lon="0" rev="1200000"/>
+            </a:lightRig>
+          </a:scene3d>
+          <a:sp3d>
+            <a:bevelT w="63500" h="25400"/>
+          </a:sp3d>
+        </a:effectStyle>
+      </a:effectStyleLst>
+      <a:bgFillStyleLst>
+        <a:solidFill>
+          <a:schemeClr val="phClr"/>
+        </a:solidFill>
+        <a:gradFill rotWithShape="1">
+          <a:gsLst>
+            <a:gs pos="0">
+              <a:schemeClr val="phClr">
+                <a:tint val="40000"/>
+                <a:satMod val="350000"/>
+              </a:schemeClr>
+            </a:gs>
+            <a:gs pos="40000">
+              <a:schemeClr val="phClr">
+                <a:tint val="45000"/>
+                <a:shade val="99000"/>
+                <a:satMod val="350000"/>
+              </a:schemeClr>
+            </a:gs>
+            <a:gs pos="100000">
+              <a:schemeClr val="phClr">
+                <a:shade val="20000"/>
+                <a:satMod val="255000"/>
+              </a:schemeClr>
+            </a:gs>
+          </a:gsLst>
+          <a:path path="circle">
+            <a:fillToRect l="50000" t="-80000" r="50000" b="180000"/>
+          </a:path>
+        </a:gradFill>
+        <a:gradFill rotWithShape="1">
+          <a:gsLst>
+            <a:gs pos="0">
+              <a:schemeClr val="phClr">
+                <a:tint val="80000"/>
+                <a:satMod val="300000"/>
+              </a:schemeClr>
+            </a:gs>
+            <a:gs pos="100000">
+              <a:schemeClr val="phClr">
+                <a:shade val="30000"/>
+                <a:satMod val="200000"/>
+              </a:schemeClr>
+            </a:gs>
+          </a:gsLst>
+          <a:path path="circle">
+            <a:fillToRect l="50000" t="50000" r="50000" b="50000"/>
+          </a:path>
+        </a:gradFill>
+      </a:bgFillStyleLst>
+    </a:fmtScheme>
+  </a:themeElements>
+</a:theme>
+</file>
+
+<file path=ppt/theme/theme3.xml><?xml version="1.0" encoding="utf-8"?>
 <a:theme xmlns:a="http://schemas.openxmlformats.org/drawingml/2006/main" xmlns:r="http://schemas.openxmlformats.org/officeDocument/2006/relationships" name="2_Office Theme">
   <a:themeElements>
     <a:clrScheme name="Office Theme">
@@ -21050,283 +22375,4 @@
     </a:fmtScheme>
   </a:themeElements>
 </a:theme>
-</file>
-
-<file path=ppt/theme/theme3.xml><?xml version="1.0" encoding="utf-8"?>
-<a:theme xmlns:a="http://schemas.openxmlformats.org/drawingml/2006/main" xmlns:r="http://schemas.openxmlformats.org/officeDocument/2006/relationships" name="Тема Office">
-  <a:themeElements>
-    <a:clrScheme name="Стандартная">
-      <a:dk1>
-        <a:srgbClr val="000000"/>
-      </a:dk1>
-      <a:lt1>
-        <a:srgbClr val="FFFFFF"/>
-      </a:lt1>
-      <a:dk2>
-        <a:srgbClr val="44546A"/>
-      </a:dk2>
-      <a:lt2>
-        <a:srgbClr val="E7E6E6"/>
-      </a:lt2>
-      <a:accent1>
-        <a:srgbClr val="4472C4"/>
-      </a:accent1>
-      <a:accent2>
-        <a:srgbClr val="ED7D31"/>
-      </a:accent2>
-      <a:accent3>
-        <a:srgbClr val="A5A5A5"/>
-      </a:accent3>
-      <a:accent4>
-        <a:srgbClr val="FFC000"/>
-      </a:accent4>
-      <a:accent5>
-        <a:srgbClr val="5B9BD5"/>
-      </a:accent5>
-      <a:accent6>
-        <a:srgbClr val="70AD47"/>
-      </a:accent6>
-      <a:hlink>
-        <a:srgbClr val="0563C1"/>
-      </a:hlink>
-      <a:folHlink>
-        <a:srgbClr val="954F72"/>
-      </a:folHlink>
-    </a:clrScheme>
-    <a:fontScheme name="Office">
-      <a:majorFont>
-        <a:latin typeface="Arial"/>
-        <a:ea typeface=""/>
-        <a:cs typeface=""/>
-        <a:font script="Jpan" typeface="ＭＳ Ｐゴシック"/>
-        <a:font script="Hang" typeface="맑은 고딕"/>
-        <a:font script="Hans" typeface="宋体"/>
-        <a:font script="Hant" typeface="新細明體"/>
-        <a:font script="Arab" typeface="Times New Roman"/>
-        <a:font script="Hebr" typeface="Times New Roman"/>
-        <a:font script="Thai" typeface="Angsana New"/>
-        <a:font script="Ethi" typeface="Nyala"/>
-        <a:font script="Beng" typeface="Vrinda"/>
-        <a:font script="Gujr" typeface="Shruti"/>
-        <a:font script="Khmr" typeface="MoolBoran"/>
-        <a:font script="Knda" typeface="Tunga"/>
-        <a:font script="Guru" typeface="Raavi"/>
-        <a:font script="Cans" typeface="Euphemia"/>
-        <a:font script="Cher" typeface="Plantagenet Cherokee"/>
-        <a:font script="Yiii" typeface="Microsoft Yi Baiti"/>
-        <a:font script="Tibt" typeface="Microsoft Himalaya"/>
-        <a:font script="Thaa" typeface="MV Boli"/>
-        <a:font script="Deva" typeface="Mangal"/>
-        <a:font script="Telu" typeface="Gautami"/>
-        <a:font script="Taml" typeface="Latha"/>
-        <a:font script="Syrc" typeface="Estrangelo Edessa"/>
-        <a:font script="Orya" typeface="Kalinga"/>
-        <a:font script="Mlym" typeface="Kartika"/>
-        <a:font script="Laoo" typeface="DokChampa"/>
-        <a:font script="Sinh" typeface="Iskoola Pota"/>
-        <a:font script="Mong" typeface="Mongolian Baiti"/>
-        <a:font script="Viet" typeface="Times New Roman"/>
-        <a:font script="Uigh" typeface="Microsoft Uighur"/>
-        <a:font script="Geor" typeface="Sylfaen"/>
-      </a:majorFont>
-      <a:minorFont>
-        <a:latin typeface="Arial"/>
-        <a:ea typeface=""/>
-        <a:cs typeface=""/>
-        <a:font script="Jpan" typeface="ＭＳ Ｐゴシック"/>
-        <a:font script="Hang" typeface="맑은 고딕"/>
-        <a:font script="Hans" typeface="宋体"/>
-        <a:font script="Hant" typeface="新細明體"/>
-        <a:font script="Arab" typeface="Arial"/>
-        <a:font script="Hebr" typeface="Arial"/>
-        <a:font script="Thai" typeface="Cordia New"/>
-        <a:font script="Ethi" typeface="Nyala"/>
-        <a:font script="Beng" typeface="Vrinda"/>
-        <a:font script="Gujr" typeface="Shruti"/>
-        <a:font script="Khmr" typeface="DaunPenh"/>
-        <a:font script="Knda" typeface="Tunga"/>
-        <a:font script="Guru" typeface="Raavi"/>
-        <a:font script="Cans" typeface="Euphemia"/>
-        <a:font script="Cher" typeface="Plantagenet Cherokee"/>
-        <a:font script="Yiii" typeface="Microsoft Yi Baiti"/>
-        <a:font script="Tibt" typeface="Microsoft Himalaya"/>
-        <a:font script="Thaa" typeface="MV Boli"/>
-        <a:font script="Deva" typeface="Mangal"/>
-        <a:font script="Telu" typeface="Gautami"/>
-        <a:font script="Taml" typeface="Latha"/>
-        <a:font script="Syrc" typeface="Estrangelo Edessa"/>
-        <a:font script="Orya" typeface="Kalinga"/>
-        <a:font script="Mlym" typeface="Kartika"/>
-        <a:font script="Laoo" typeface="DokChampa"/>
-        <a:font script="Sinh" typeface="Iskoola Pota"/>
-        <a:font script="Mong" typeface="Mongolian Baiti"/>
-        <a:font script="Viet" typeface="Arial"/>
-        <a:font script="Uigh" typeface="Microsoft Uighur"/>
-        <a:font script="Geor" typeface="Sylfaen"/>
-      </a:minorFont>
-    </a:fontScheme>
-    <a:fmtScheme name="Office">
-      <a:fillStyleLst>
-        <a:solidFill>
-          <a:schemeClr val="phClr"/>
-        </a:solidFill>
-        <a:gradFill rotWithShape="1">
-          <a:gsLst>
-            <a:gs pos="0">
-              <a:schemeClr val="phClr">
-                <a:tint val="50000"/>
-                <a:satMod val="300000"/>
-              </a:schemeClr>
-            </a:gs>
-            <a:gs pos="35000">
-              <a:schemeClr val="phClr">
-                <a:tint val="37000"/>
-                <a:satMod val="300000"/>
-              </a:schemeClr>
-            </a:gs>
-            <a:gs pos="100000">
-              <a:schemeClr val="phClr">
-                <a:tint val="15000"/>
-                <a:satMod val="350000"/>
-              </a:schemeClr>
-            </a:gs>
-          </a:gsLst>
-          <a:lin ang="16200000" scaled="1"/>
-        </a:gradFill>
-        <a:gradFill rotWithShape="1">
-          <a:gsLst>
-            <a:gs pos="0">
-              <a:schemeClr val="phClr">
-                <a:tint val="100000"/>
-                <a:shade val="100000"/>
-                <a:satMod val="130000"/>
-              </a:schemeClr>
-            </a:gs>
-            <a:gs pos="100000">
-              <a:schemeClr val="phClr">
-                <a:tint val="50000"/>
-                <a:shade val="100000"/>
-                <a:satMod val="350000"/>
-              </a:schemeClr>
-            </a:gs>
-          </a:gsLst>
-          <a:lin ang="16200000" scaled="0"/>
-        </a:gradFill>
-      </a:fillStyleLst>
-      <a:lnStyleLst>
-        <a:ln w="9525" cap="flat" cmpd="sng" algn="ctr">
-          <a:solidFill>
-            <a:schemeClr val="phClr">
-              <a:shade val="95000"/>
-              <a:satMod val="105000"/>
-            </a:schemeClr>
-          </a:solidFill>
-          <a:prstDash val="solid"/>
-        </a:ln>
-        <a:ln w="25400" cap="flat" cmpd="sng" algn="ctr">
-          <a:solidFill>
-            <a:schemeClr val="phClr"/>
-          </a:solidFill>
-          <a:prstDash val="solid"/>
-        </a:ln>
-        <a:ln w="38100" cap="flat" cmpd="sng" algn="ctr">
-          <a:solidFill>
-            <a:schemeClr val="phClr"/>
-          </a:solidFill>
-          <a:prstDash val="solid"/>
-        </a:ln>
-      </a:lnStyleLst>
-      <a:effectStyleLst>
-        <a:effectStyle>
-          <a:effectLst>
-            <a:outerShdw blurRad="40000" dist="20000" dir="5400000" rotWithShape="0">
-              <a:srgbClr val="000000">
-                <a:alpha val="38000"/>
-              </a:srgbClr>
-            </a:outerShdw>
-          </a:effectLst>
-        </a:effectStyle>
-        <a:effectStyle>
-          <a:effectLst>
-            <a:outerShdw blurRad="40000" dist="23000" dir="5400000" rotWithShape="0">
-              <a:srgbClr val="000000">
-                <a:alpha val="35000"/>
-              </a:srgbClr>
-            </a:outerShdw>
-          </a:effectLst>
-        </a:effectStyle>
-        <a:effectStyle>
-          <a:effectLst>
-            <a:outerShdw blurRad="40000" dist="23000" dir="5400000" rotWithShape="0">
-              <a:srgbClr val="000000">
-                <a:alpha val="35000"/>
-              </a:srgbClr>
-            </a:outerShdw>
-          </a:effectLst>
-          <a:scene3d>
-            <a:camera prst="orthographicFront">
-              <a:rot lat="0" lon="0" rev="0"/>
-            </a:camera>
-            <a:lightRig rig="threePt" dir="t">
-              <a:rot lat="0" lon="0" rev="1200000"/>
-            </a:lightRig>
-          </a:scene3d>
-          <a:sp3d>
-            <a:bevelT w="63500" h="25400"/>
-          </a:sp3d>
-        </a:effectStyle>
-      </a:effectStyleLst>
-      <a:bgFillStyleLst>
-        <a:solidFill>
-          <a:schemeClr val="phClr"/>
-        </a:solidFill>
-        <a:gradFill rotWithShape="1">
-          <a:gsLst>
-            <a:gs pos="0">
-              <a:schemeClr val="phClr">
-                <a:tint val="40000"/>
-                <a:satMod val="350000"/>
-              </a:schemeClr>
-            </a:gs>
-            <a:gs pos="40000">
-              <a:schemeClr val="phClr">
-                <a:tint val="45000"/>
-                <a:shade val="99000"/>
-                <a:satMod val="350000"/>
-              </a:schemeClr>
-            </a:gs>
-            <a:gs pos="100000">
-              <a:schemeClr val="phClr">
-                <a:shade val="20000"/>
-                <a:satMod val="255000"/>
-              </a:schemeClr>
-            </a:gs>
-          </a:gsLst>
-          <a:path path="circle">
-            <a:fillToRect l="50000" t="-80000" r="50000" b="180000"/>
-          </a:path>
-        </a:gradFill>
-        <a:gradFill rotWithShape="1">
-          <a:gsLst>
-            <a:gs pos="0">
-              <a:schemeClr val="phClr">
-                <a:tint val="80000"/>
-                <a:satMod val="300000"/>
-              </a:schemeClr>
-            </a:gs>
-            <a:gs pos="100000">
-              <a:schemeClr val="phClr">
-                <a:shade val="30000"/>
-                <a:satMod val="200000"/>
-              </a:schemeClr>
-            </a:gs>
-          </a:gsLst>
-          <a:path path="circle">
-            <a:fillToRect l="50000" t="50000" r="50000" b="50000"/>
-          </a:path>
-        </a:gradFill>
-      </a:bgFillStyleLst>
-    </a:fmtScheme>
-  </a:themeElements>
-</a:theme>
 </file>
</xml_diff>